<commit_message>
updated deck with downstream increment principle slide
</commit_message>
<xml_diff>
--- a/Tooling-Landscape/Dummies/Sharing_OSM_Test_dummies_update_2024-05.pptx
+++ b/Tooling-Landscape/Dummies/Sharing_OSM_Test_dummies_update_2024-05.pptx
@@ -5,10 +5,10 @@
     <p:sldMasterId id="2147483669" r:id="rId19"/>
   </p:sldMasterIdLst>
   <p:notesMasterIdLst>
-    <p:notesMasterId r:id="rId41"/>
+    <p:notesMasterId r:id="rId42"/>
   </p:notesMasterIdLst>
   <p:handoutMasterIdLst>
-    <p:handoutMasterId r:id="rId42"/>
+    <p:handoutMasterId r:id="rId43"/>
   </p:handoutMasterIdLst>
   <p:sldIdLst>
     <p:sldId id="1133" r:id="rId20"/>
@@ -21,23 +21,24 @@
     <p:sldId id="2909" r:id="rId27"/>
     <p:sldId id="2910" r:id="rId28"/>
     <p:sldId id="2911" r:id="rId29"/>
-    <p:sldId id="2913" r:id="rId30"/>
-    <p:sldId id="2894" r:id="rId31"/>
-    <p:sldId id="2906" r:id="rId32"/>
-    <p:sldId id="2896" r:id="rId33"/>
-    <p:sldId id="2905" r:id="rId34"/>
-    <p:sldId id="2899" r:id="rId35"/>
-    <p:sldId id="2900" r:id="rId36"/>
-    <p:sldId id="2901" r:id="rId37"/>
-    <p:sldId id="2902" r:id="rId38"/>
-    <p:sldId id="2903" r:id="rId39"/>
-    <p:sldId id="2904" r:id="rId40"/>
+    <p:sldId id="2914" r:id="rId30"/>
+    <p:sldId id="2913" r:id="rId31"/>
+    <p:sldId id="2894" r:id="rId32"/>
+    <p:sldId id="2906" r:id="rId33"/>
+    <p:sldId id="2896" r:id="rId34"/>
+    <p:sldId id="2905" r:id="rId35"/>
+    <p:sldId id="2899" r:id="rId36"/>
+    <p:sldId id="2900" r:id="rId37"/>
+    <p:sldId id="2901" r:id="rId38"/>
+    <p:sldId id="2902" r:id="rId39"/>
+    <p:sldId id="2903" r:id="rId40"/>
+    <p:sldId id="2904" r:id="rId41"/>
   </p:sldIdLst>
   <p:sldSz cx="12198350" cy="6858000"/>
   <p:notesSz cx="7102475" cy="10234613"/>
   <p:custDataLst>
-    <p:custData r:id="rId18"/>
-    <p:tags r:id="rId43"/>
+    <p:custData r:id="rId14"/>
+    <p:tags r:id="rId44"/>
   </p:custDataLst>
   <p:defaultTextStyle>
     <a:defPPr>
@@ -7000,6 +7001,2608 @@
           <a:p>
             <a:r>
               <a:rPr lang="de-DE" dirty="0"/>
+              <a:t>Downstream </a:t>
+            </a:r>
+            <a:r>
+              <a:rPr lang="de-DE" dirty="0" err="1"/>
+              <a:t>Increment</a:t>
+            </a:r>
+            <a:r>
+              <a:rPr lang="de-DE" dirty="0"/>
+              <a:t> </a:t>
+            </a:r>
+            <a:r>
+              <a:rPr lang="de-DE" dirty="0" err="1"/>
+              <a:t>Principle</a:t>
+            </a:r>
+            <a:endParaRPr lang="de-DE" dirty="0"/>
+          </a:p>
+        </p:txBody>
+      </p:sp>
+      <p:sp>
+        <p:nvSpPr>
+          <p:cNvPr id="13" name="Textfeld 12">
+            <a:extLst>
+              <a:ext uri="{FF2B5EF4-FFF2-40B4-BE49-F238E27FC236}">
+                <a16:creationId xmlns:a16="http://schemas.microsoft.com/office/drawing/2014/main" id="{BC3F8F6D-E45A-A355-22FD-AD09AC80BCB0}"/>
+              </a:ext>
+            </a:extLst>
+          </p:cNvPr>
+          <p:cNvSpPr txBox="1"/>
+          <p:nvPr/>
+        </p:nvSpPr>
+        <p:spPr>
+          <a:xfrm>
+            <a:off x="1716358" y="4900710"/>
+            <a:ext cx="817757" cy="260195"/>
+          </a:xfrm>
+          <a:prstGeom prst="rect">
+            <a:avLst/>
+          </a:prstGeom>
+          <a:noFill/>
+        </p:spPr>
+        <p:txBody>
+          <a:bodyPr wrap="square" lIns="0" tIns="0" rIns="0" bIns="0" rtlCol="0">
+            <a:noAutofit/>
+          </a:bodyPr>
+          <a:lstStyle/>
+          <a:p>
+            <a:pPr algn="ctr">
+              <a:lnSpc>
+                <a:spcPct val="110000"/>
+              </a:lnSpc>
+              <a:spcBef>
+                <a:spcPts val="0"/>
+              </a:spcBef>
+            </a:pPr>
+            <a:r>
+              <a:rPr lang="de-DE" sz="1400" dirty="0" err="1">
+                <a:solidFill>
+                  <a:schemeClr val="tx1"/>
+                </a:solidFill>
+              </a:rPr>
+              <a:t>upstream</a:t>
+            </a:r>
+            <a:endParaRPr lang="de-DE" sz="1400" dirty="0">
+              <a:solidFill>
+                <a:schemeClr val="tx1"/>
+              </a:solidFill>
+            </a:endParaRPr>
+          </a:p>
+        </p:txBody>
+      </p:sp>
+      <p:sp>
+        <p:nvSpPr>
+          <p:cNvPr id="14" name="Textfeld 13">
+            <a:extLst>
+              <a:ext uri="{FF2B5EF4-FFF2-40B4-BE49-F238E27FC236}">
+                <a16:creationId xmlns:a16="http://schemas.microsoft.com/office/drawing/2014/main" id="{E6F880B7-F90A-09AA-898E-9A1A33822AE5}"/>
+              </a:ext>
+            </a:extLst>
+          </p:cNvPr>
+          <p:cNvSpPr txBox="1"/>
+          <p:nvPr/>
+        </p:nvSpPr>
+        <p:spPr>
+          <a:xfrm>
+            <a:off x="4062348" y="4900710"/>
+            <a:ext cx="1535152" cy="260195"/>
+          </a:xfrm>
+          <a:prstGeom prst="rect">
+            <a:avLst/>
+          </a:prstGeom>
+          <a:noFill/>
+        </p:spPr>
+        <p:txBody>
+          <a:bodyPr wrap="square" lIns="0" tIns="0" rIns="0" bIns="0" rtlCol="0">
+            <a:noAutofit/>
+          </a:bodyPr>
+          <a:lstStyle/>
+          <a:p>
+            <a:pPr algn="ctr">
+              <a:lnSpc>
+                <a:spcPct val="110000"/>
+              </a:lnSpc>
+              <a:spcBef>
+                <a:spcPts val="0"/>
+              </a:spcBef>
+            </a:pPr>
+            <a:r>
+              <a:rPr lang="de-DE" sz="1400" dirty="0" err="1">
+                <a:solidFill>
+                  <a:schemeClr val="tx1"/>
+                </a:solidFill>
+              </a:rPr>
+              <a:t>dummy</a:t>
+            </a:r>
+            <a:r>
+              <a:rPr lang="de-DE" sz="1400" dirty="0">
+                <a:solidFill>
+                  <a:schemeClr val="tx1"/>
+                </a:solidFill>
+              </a:rPr>
+              <a:t> </a:t>
+            </a:r>
+            <a:r>
+              <a:rPr lang="de-DE" sz="1400" dirty="0" err="1">
+                <a:solidFill>
+                  <a:schemeClr val="tx1"/>
+                </a:solidFill>
+              </a:rPr>
+              <a:t>repository</a:t>
+            </a:r>
+            <a:endParaRPr lang="de-DE" sz="1400" dirty="0">
+              <a:solidFill>
+                <a:schemeClr val="tx1"/>
+              </a:solidFill>
+            </a:endParaRPr>
+          </a:p>
+        </p:txBody>
+      </p:sp>
+      <p:sp>
+        <p:nvSpPr>
+          <p:cNvPr id="15" name="Textfeld 14">
+            <a:extLst>
+              <a:ext uri="{FF2B5EF4-FFF2-40B4-BE49-F238E27FC236}">
+                <a16:creationId xmlns:a16="http://schemas.microsoft.com/office/drawing/2014/main" id="{A66D5F39-A16A-EE09-37EA-3B79A19FD71C}"/>
+              </a:ext>
+            </a:extLst>
+          </p:cNvPr>
+          <p:cNvSpPr txBox="1"/>
+          <p:nvPr/>
+        </p:nvSpPr>
+        <p:spPr>
+          <a:xfrm>
+            <a:off x="6964871" y="4900710"/>
+            <a:ext cx="1393903" cy="260195"/>
+          </a:xfrm>
+          <a:prstGeom prst="rect">
+            <a:avLst/>
+          </a:prstGeom>
+          <a:noFill/>
+        </p:spPr>
+        <p:txBody>
+          <a:bodyPr wrap="square" lIns="0" tIns="0" rIns="0" bIns="0" rtlCol="0">
+            <a:noAutofit/>
+          </a:bodyPr>
+          <a:lstStyle/>
+          <a:p>
+            <a:pPr algn="ctr">
+              <a:lnSpc>
+                <a:spcPct val="110000"/>
+              </a:lnSpc>
+              <a:spcBef>
+                <a:spcPts val="0"/>
+              </a:spcBef>
+            </a:pPr>
+            <a:r>
+              <a:rPr lang="de-DE" sz="1400" dirty="0">
+                <a:solidFill>
+                  <a:schemeClr val="tx1"/>
+                </a:solidFill>
+              </a:rPr>
+              <a:t>tool-project</a:t>
+            </a:r>
+          </a:p>
+        </p:txBody>
+      </p:sp>
+      <p:sp>
+        <p:nvSpPr>
+          <p:cNvPr id="16" name="Textfeld 15">
+            <a:extLst>
+              <a:ext uri="{FF2B5EF4-FFF2-40B4-BE49-F238E27FC236}">
+                <a16:creationId xmlns:a16="http://schemas.microsoft.com/office/drawing/2014/main" id="{01769E7F-02CE-CDDF-7E48-96FB73BC152E}"/>
+              </a:ext>
+            </a:extLst>
+          </p:cNvPr>
+          <p:cNvSpPr txBox="1"/>
+          <p:nvPr/>
+        </p:nvSpPr>
+        <p:spPr>
+          <a:xfrm>
+            <a:off x="9549159" y="4900710"/>
+            <a:ext cx="1393903" cy="260195"/>
+          </a:xfrm>
+          <a:prstGeom prst="rect">
+            <a:avLst/>
+          </a:prstGeom>
+          <a:noFill/>
+        </p:spPr>
+        <p:txBody>
+          <a:bodyPr wrap="square" lIns="0" tIns="0" rIns="0" bIns="0" rtlCol="0">
+            <a:noAutofit/>
+          </a:bodyPr>
+          <a:lstStyle/>
+          <a:p>
+            <a:pPr algn="ctr">
+              <a:lnSpc>
+                <a:spcPct val="110000"/>
+              </a:lnSpc>
+              <a:spcBef>
+                <a:spcPts val="0"/>
+              </a:spcBef>
+            </a:pPr>
+            <a:r>
+              <a:rPr lang="de-DE" sz="1400" dirty="0" err="1">
+                <a:solidFill>
+                  <a:schemeClr val="tx1"/>
+                </a:solidFill>
+              </a:rPr>
+              <a:t>installation</a:t>
+            </a:r>
+            <a:r>
+              <a:rPr lang="de-DE" sz="1400" dirty="0">
+                <a:solidFill>
+                  <a:schemeClr val="tx1"/>
+                </a:solidFill>
+              </a:rPr>
+              <a:t> check</a:t>
+            </a:r>
+          </a:p>
+        </p:txBody>
+      </p:sp>
+      <p:sp>
+        <p:nvSpPr>
+          <p:cNvPr id="17" name="Rechteck 16">
+            <a:extLst>
+              <a:ext uri="{FF2B5EF4-FFF2-40B4-BE49-F238E27FC236}">
+                <a16:creationId xmlns:a16="http://schemas.microsoft.com/office/drawing/2014/main" id="{21FFECB8-8C1D-F286-C51F-E809A907E921}"/>
+              </a:ext>
+            </a:extLst>
+          </p:cNvPr>
+          <p:cNvSpPr/>
+          <p:nvPr/>
+        </p:nvSpPr>
+        <p:spPr bwMode="auto">
+          <a:xfrm>
+            <a:off x="929268" y="4475356"/>
+            <a:ext cx="10614605" cy="347798"/>
+          </a:xfrm>
+          <a:prstGeom prst="rect">
+            <a:avLst/>
+          </a:prstGeom>
+          <a:solidFill>
+            <a:schemeClr val="accent2"/>
+          </a:solidFill>
+          <a:ln>
+            <a:noFill/>
+          </a:ln>
+          <a:effectLst/>
+          <a:extLst>
+            <a:ext uri="{91240B29-F687-4F45-9708-019B960494DF}">
+              <a14:hiddenLine xmlns:a14="http://schemas.microsoft.com/office/drawing/2010/main" w="9525">
+                <a:solidFill>
+                  <a:schemeClr val="tx1"/>
+                </a:solidFill>
+                <a:miter lim="800000"/>
+                <a:headEnd/>
+                <a:tailEnd/>
+              </a14:hiddenLine>
+            </a:ext>
+            <a:ext uri="{AF507438-7753-43E0-B8FC-AC1667EBCBE1}">
+              <a14:hiddenEffects xmlns:a14="http://schemas.microsoft.com/office/drawing/2010/main">
+                <a:effectLst>
+                  <a:outerShdw blurRad="63500" dist="38099" dir="2700000" algn="ctr" rotWithShape="0">
+                    <a:schemeClr val="bg2">
+                      <a:alpha val="74998"/>
+                    </a:schemeClr>
+                  </a:outerShdw>
+                </a:effectLst>
+              </a14:hiddenEffects>
+            </a:ext>
+          </a:extLst>
+        </p:spPr>
+        <p:txBody>
+          <a:bodyPr wrap="square" lIns="108000" tIns="54000" rIns="108000" bIns="54000" numCol="1" spcCol="72000" rtlCol="0" anchor="ctr">
+            <a:noAutofit/>
+          </a:bodyPr>
+          <a:lstStyle/>
+          <a:p>
+            <a:pPr>
+              <a:lnSpc>
+                <a:spcPct val="110000"/>
+              </a:lnSpc>
+              <a:spcBef>
+                <a:spcPct val="0"/>
+              </a:spcBef>
+              <a:buFont typeface="Wingdings" charset="0"/>
+              <a:buNone/>
+            </a:pPr>
+            <a:r>
+              <a:rPr lang="de-DE" sz="1600" b="1" dirty="0" err="1">
+                <a:solidFill>
+                  <a:schemeClr val="tx1"/>
+                </a:solidFill>
+              </a:rPr>
+              <a:t>master</a:t>
+            </a:r>
+            <a:r>
+              <a:rPr lang="de-DE" sz="1600" b="1" dirty="0">
+                <a:solidFill>
+                  <a:schemeClr val="tx1"/>
+                </a:solidFill>
+              </a:rPr>
+              <a:t> - Core </a:t>
+            </a:r>
+            <a:r>
+              <a:rPr lang="de-DE" sz="1600" b="1" dirty="0" err="1">
+                <a:solidFill>
+                  <a:schemeClr val="tx1"/>
+                </a:solidFill>
+              </a:rPr>
+              <a:t>content</a:t>
+            </a:r>
+            <a:endParaRPr lang="de-DE" sz="1600" b="1" dirty="0">
+              <a:solidFill>
+                <a:schemeClr val="tx1"/>
+              </a:solidFill>
+            </a:endParaRPr>
+          </a:p>
+        </p:txBody>
+      </p:sp>
+      <p:sp>
+        <p:nvSpPr>
+          <p:cNvPr id="18" name="Rechteck 17">
+            <a:extLst>
+              <a:ext uri="{FF2B5EF4-FFF2-40B4-BE49-F238E27FC236}">
+                <a16:creationId xmlns:a16="http://schemas.microsoft.com/office/drawing/2014/main" id="{2D62991E-EC36-CF36-877B-1BFF0172A6DC}"/>
+              </a:ext>
+            </a:extLst>
+          </p:cNvPr>
+          <p:cNvSpPr/>
+          <p:nvPr/>
+        </p:nvSpPr>
+        <p:spPr bwMode="auto">
+          <a:xfrm>
+            <a:off x="3427141" y="4078899"/>
+            <a:ext cx="8116732" cy="347798"/>
+          </a:xfrm>
+          <a:prstGeom prst="rect">
+            <a:avLst/>
+          </a:prstGeom>
+          <a:solidFill>
+            <a:schemeClr val="accent3">
+              <a:lumMod val="20000"/>
+              <a:lumOff val="80000"/>
+            </a:schemeClr>
+          </a:solidFill>
+          <a:ln>
+            <a:noFill/>
+          </a:ln>
+          <a:effectLst/>
+        </p:spPr>
+        <p:txBody>
+          <a:bodyPr wrap="square" lIns="108000" tIns="54000" rIns="108000" bIns="54000" numCol="1" spcCol="72000" rtlCol="0" anchor="ctr">
+            <a:noAutofit/>
+          </a:bodyPr>
+          <a:lstStyle/>
+          <a:p>
+            <a:pPr>
+              <a:lnSpc>
+                <a:spcPct val="110000"/>
+              </a:lnSpc>
+              <a:spcBef>
+                <a:spcPct val="0"/>
+              </a:spcBef>
+              <a:buFont typeface="Wingdings" charset="0"/>
+              <a:buNone/>
+            </a:pPr>
+            <a:r>
+              <a:rPr lang="de-DE" sz="1600" b="1" dirty="0">
+                <a:solidFill>
+                  <a:schemeClr val="tx1"/>
+                </a:solidFill>
+              </a:rPr>
+              <a:t>+ </a:t>
+            </a:r>
+            <a:r>
+              <a:rPr lang="de-DE" sz="1600" b="1" dirty="0" err="1">
+                <a:solidFill>
+                  <a:schemeClr val="tx1"/>
+                </a:solidFill>
+              </a:rPr>
+              <a:t>doc</a:t>
+            </a:r>
+            <a:r>
+              <a:rPr lang="de-DE" sz="1600" b="1" dirty="0">
+                <a:solidFill>
+                  <a:schemeClr val="tx1"/>
+                </a:solidFill>
+              </a:rPr>
+              <a:t> – </a:t>
+            </a:r>
+            <a:r>
+              <a:rPr lang="de-DE" sz="1600" b="1" dirty="0" err="1">
+                <a:solidFill>
+                  <a:schemeClr val="tx1"/>
+                </a:solidFill>
+              </a:rPr>
+              <a:t>branch</a:t>
+            </a:r>
+            <a:r>
+              <a:rPr lang="de-DE" sz="1600" b="1" dirty="0">
+                <a:solidFill>
+                  <a:schemeClr val="tx1"/>
+                </a:solidFill>
+              </a:rPr>
+              <a:t> </a:t>
+            </a:r>
+            <a:r>
+              <a:rPr lang="de-DE" sz="1600" b="1" dirty="0" err="1">
+                <a:solidFill>
+                  <a:schemeClr val="tx1"/>
+                </a:solidFill>
+              </a:rPr>
+              <a:t>with</a:t>
+            </a:r>
+            <a:r>
+              <a:rPr lang="de-DE" sz="1600" b="1" dirty="0">
+                <a:solidFill>
+                  <a:schemeClr val="tx1"/>
+                </a:solidFill>
+              </a:rPr>
+              <a:t> </a:t>
+            </a:r>
+            <a:r>
+              <a:rPr lang="de-DE" sz="1600" b="1" dirty="0" err="1">
+                <a:solidFill>
+                  <a:schemeClr val="tx1"/>
+                </a:solidFill>
+              </a:rPr>
+              <a:t>general</a:t>
+            </a:r>
+            <a:r>
+              <a:rPr lang="de-DE" sz="1600" b="1" dirty="0">
+                <a:solidFill>
+                  <a:schemeClr val="tx1"/>
+                </a:solidFill>
+              </a:rPr>
+              <a:t> </a:t>
+            </a:r>
+            <a:r>
+              <a:rPr lang="de-DE" sz="1600" b="1" dirty="0" err="1">
+                <a:solidFill>
+                  <a:schemeClr val="tx1"/>
+                </a:solidFill>
+              </a:rPr>
+              <a:t>dummy</a:t>
+            </a:r>
+            <a:r>
+              <a:rPr lang="de-DE" sz="1600" b="1" dirty="0">
+                <a:solidFill>
+                  <a:schemeClr val="tx1"/>
+                </a:solidFill>
+              </a:rPr>
+              <a:t> </a:t>
+            </a:r>
+            <a:r>
+              <a:rPr lang="de-DE" sz="1600" b="1" dirty="0" err="1">
+                <a:solidFill>
+                  <a:schemeClr val="tx1"/>
+                </a:solidFill>
+              </a:rPr>
+              <a:t>documentation</a:t>
+            </a:r>
+            <a:r>
+              <a:rPr lang="de-DE" sz="1600" b="1" dirty="0">
+                <a:solidFill>
+                  <a:schemeClr val="tx1"/>
+                </a:solidFill>
+              </a:rPr>
+              <a:t> *.md</a:t>
+            </a:r>
+          </a:p>
+        </p:txBody>
+      </p:sp>
+      <p:sp>
+        <p:nvSpPr>
+          <p:cNvPr id="19" name="Rechteck 18">
+            <a:extLst>
+              <a:ext uri="{FF2B5EF4-FFF2-40B4-BE49-F238E27FC236}">
+                <a16:creationId xmlns:a16="http://schemas.microsoft.com/office/drawing/2014/main" id="{7A980DF3-8009-1865-C526-1189AAB15DAE}"/>
+              </a:ext>
+            </a:extLst>
+          </p:cNvPr>
+          <p:cNvSpPr/>
+          <p:nvPr/>
+        </p:nvSpPr>
+        <p:spPr bwMode="auto">
+          <a:xfrm>
+            <a:off x="3427141" y="3682444"/>
+            <a:ext cx="8116732" cy="347798"/>
+          </a:xfrm>
+          <a:prstGeom prst="rect">
+            <a:avLst/>
+          </a:prstGeom>
+          <a:solidFill>
+            <a:schemeClr val="accent6">
+              <a:lumMod val="20000"/>
+              <a:lumOff val="80000"/>
+            </a:schemeClr>
+          </a:solidFill>
+          <a:ln>
+            <a:noFill/>
+          </a:ln>
+          <a:effectLst/>
+        </p:spPr>
+        <p:txBody>
+          <a:bodyPr wrap="square" lIns="108000" tIns="54000" rIns="108000" bIns="54000" numCol="1" spcCol="72000" rtlCol="0" anchor="ctr">
+            <a:noAutofit/>
+          </a:bodyPr>
+          <a:lstStyle/>
+          <a:p>
+            <a:pPr>
+              <a:lnSpc>
+                <a:spcPct val="110000"/>
+              </a:lnSpc>
+              <a:spcBef>
+                <a:spcPct val="0"/>
+              </a:spcBef>
+              <a:buFont typeface="Wingdings" charset="0"/>
+              <a:buNone/>
+            </a:pPr>
+            <a:r>
+              <a:rPr lang="de-DE" sz="1600" b="1" dirty="0">
+                <a:solidFill>
+                  <a:schemeClr val="tx1"/>
+                </a:solidFill>
+              </a:rPr>
+              <a:t>+ </a:t>
+            </a:r>
+            <a:r>
+              <a:rPr lang="de-DE" sz="1600" b="1" dirty="0" err="1">
+                <a:solidFill>
+                  <a:schemeClr val="tx1"/>
+                </a:solidFill>
+              </a:rPr>
+              <a:t>demo</a:t>
+            </a:r>
+            <a:r>
+              <a:rPr lang="de-DE" sz="1600" b="1" dirty="0">
+                <a:solidFill>
+                  <a:schemeClr val="tx1"/>
+                </a:solidFill>
+              </a:rPr>
+              <a:t> – </a:t>
+            </a:r>
+            <a:r>
+              <a:rPr lang="de-DE" sz="1600" b="1" dirty="0" err="1">
+                <a:solidFill>
+                  <a:schemeClr val="tx1"/>
+                </a:solidFill>
+              </a:rPr>
+              <a:t>branch</a:t>
+            </a:r>
+            <a:r>
+              <a:rPr lang="de-DE" sz="1600" b="1" dirty="0">
+                <a:solidFill>
+                  <a:schemeClr val="tx1"/>
+                </a:solidFill>
+              </a:rPr>
+              <a:t> </a:t>
+            </a:r>
+            <a:r>
+              <a:rPr lang="de-DE" sz="1600" b="1" dirty="0" err="1">
+                <a:solidFill>
+                  <a:schemeClr val="tx1"/>
+                </a:solidFill>
+              </a:rPr>
+              <a:t>with</a:t>
+            </a:r>
+            <a:r>
+              <a:rPr lang="de-DE" sz="1600" b="1" dirty="0">
+                <a:solidFill>
+                  <a:schemeClr val="tx1"/>
+                </a:solidFill>
+              </a:rPr>
+              <a:t> </a:t>
+            </a:r>
+            <a:r>
+              <a:rPr lang="de-DE" sz="1600" b="1" dirty="0" err="1">
+                <a:solidFill>
+                  <a:schemeClr val="tx1"/>
+                </a:solidFill>
+              </a:rPr>
+              <a:t>showcases</a:t>
+            </a:r>
+            <a:r>
+              <a:rPr lang="de-DE" sz="1600" b="1" dirty="0">
+                <a:solidFill>
+                  <a:schemeClr val="tx1"/>
+                </a:solidFill>
+              </a:rPr>
+              <a:t> </a:t>
+            </a:r>
+            <a:r>
+              <a:rPr lang="de-DE" sz="1600" b="1" dirty="0" err="1">
+                <a:solidFill>
+                  <a:schemeClr val="tx1"/>
+                </a:solidFill>
+              </a:rPr>
+              <a:t>demo</a:t>
+            </a:r>
+            <a:r>
+              <a:rPr lang="de-DE" sz="1600" b="1" dirty="0">
+                <a:solidFill>
+                  <a:schemeClr val="tx1"/>
+                </a:solidFill>
+              </a:rPr>
+              <a:t>/</a:t>
+            </a:r>
+            <a:r>
+              <a:rPr lang="de-DE" sz="1600" b="1" dirty="0" err="1">
+                <a:solidFill>
+                  <a:schemeClr val="tx1"/>
+                </a:solidFill>
+              </a:rPr>
+              <a:t>case_xxx</a:t>
+            </a:r>
+            <a:endParaRPr lang="de-DE" sz="1600" b="1" dirty="0">
+              <a:solidFill>
+                <a:schemeClr val="tx1"/>
+              </a:solidFill>
+            </a:endParaRPr>
+          </a:p>
+        </p:txBody>
+      </p:sp>
+      <p:sp>
+        <p:nvSpPr>
+          <p:cNvPr id="20" name="Rechteck 19">
+            <a:extLst>
+              <a:ext uri="{FF2B5EF4-FFF2-40B4-BE49-F238E27FC236}">
+                <a16:creationId xmlns:a16="http://schemas.microsoft.com/office/drawing/2014/main" id="{8C885A58-D76D-C02B-9FBE-2BEA3EFB1567}"/>
+              </a:ext>
+            </a:extLst>
+          </p:cNvPr>
+          <p:cNvSpPr/>
+          <p:nvPr/>
+        </p:nvSpPr>
+        <p:spPr bwMode="auto">
+          <a:xfrm>
+            <a:off x="3427141" y="3285989"/>
+            <a:ext cx="8116732" cy="347798"/>
+          </a:xfrm>
+          <a:prstGeom prst="rect">
+            <a:avLst/>
+          </a:prstGeom>
+          <a:solidFill>
+            <a:schemeClr val="accent5">
+              <a:lumMod val="20000"/>
+              <a:lumOff val="80000"/>
+            </a:schemeClr>
+          </a:solidFill>
+          <a:ln>
+            <a:noFill/>
+          </a:ln>
+          <a:effectLst/>
+        </p:spPr>
+        <p:txBody>
+          <a:bodyPr wrap="square" lIns="108000" tIns="54000" rIns="108000" bIns="54000" numCol="1" spcCol="72000" rtlCol="0" anchor="ctr">
+            <a:noAutofit/>
+          </a:bodyPr>
+          <a:lstStyle/>
+          <a:p>
+            <a:pPr>
+              <a:lnSpc>
+                <a:spcPct val="110000"/>
+              </a:lnSpc>
+              <a:spcBef>
+                <a:spcPct val="0"/>
+              </a:spcBef>
+              <a:buFont typeface="Wingdings" charset="0"/>
+              <a:buNone/>
+            </a:pPr>
+            <a:r>
+              <a:rPr lang="de-DE" sz="1600" b="1" dirty="0">
+                <a:solidFill>
+                  <a:schemeClr val="tx1"/>
+                </a:solidFill>
+              </a:rPr>
+              <a:t>+ </a:t>
+            </a:r>
+            <a:r>
+              <a:rPr lang="de-DE" sz="1600" b="1" dirty="0" err="1">
+                <a:solidFill>
+                  <a:schemeClr val="tx1"/>
+                </a:solidFill>
+              </a:rPr>
+              <a:t>test</a:t>
+            </a:r>
+            <a:r>
+              <a:rPr lang="de-DE" sz="1600" b="1" dirty="0">
+                <a:solidFill>
+                  <a:schemeClr val="tx1"/>
+                </a:solidFill>
+              </a:rPr>
+              <a:t> – </a:t>
+            </a:r>
+            <a:r>
+              <a:rPr lang="de-DE" sz="1600" b="1" dirty="0" err="1">
+                <a:solidFill>
+                  <a:schemeClr val="tx1"/>
+                </a:solidFill>
+              </a:rPr>
+              <a:t>branch</a:t>
+            </a:r>
+            <a:r>
+              <a:rPr lang="de-DE" sz="1600" b="1" dirty="0">
+                <a:solidFill>
+                  <a:schemeClr val="tx1"/>
+                </a:solidFill>
+              </a:rPr>
+              <a:t> </a:t>
+            </a:r>
+            <a:r>
+              <a:rPr lang="de-DE" sz="1600" b="1" dirty="0" err="1">
+                <a:solidFill>
+                  <a:schemeClr val="tx1"/>
+                </a:solidFill>
+              </a:rPr>
+              <a:t>with</a:t>
+            </a:r>
+            <a:r>
+              <a:rPr lang="de-DE" sz="1600" b="1" dirty="0">
+                <a:solidFill>
+                  <a:schemeClr val="tx1"/>
+                </a:solidFill>
+              </a:rPr>
+              <a:t> </a:t>
+            </a:r>
+            <a:r>
+              <a:rPr lang="de-DE" sz="1600" b="1" dirty="0" err="1">
+                <a:solidFill>
+                  <a:schemeClr val="tx1"/>
+                </a:solidFill>
+              </a:rPr>
+              <a:t>general</a:t>
+            </a:r>
+            <a:r>
+              <a:rPr lang="de-DE" sz="1600" b="1" dirty="0">
+                <a:solidFill>
+                  <a:schemeClr val="tx1"/>
+                </a:solidFill>
+              </a:rPr>
+              <a:t> test-</a:t>
+            </a:r>
+            <a:r>
+              <a:rPr lang="de-DE" sz="1600" b="1" dirty="0" err="1">
+                <a:solidFill>
+                  <a:schemeClr val="tx1"/>
+                </a:solidFill>
+              </a:rPr>
+              <a:t>specifications</a:t>
+            </a:r>
+            <a:r>
+              <a:rPr lang="de-DE" sz="1600" b="1" dirty="0">
+                <a:solidFill>
+                  <a:schemeClr val="tx1"/>
+                </a:solidFill>
+              </a:rPr>
+              <a:t> </a:t>
+            </a:r>
+            <a:r>
+              <a:rPr lang="de-DE" sz="1600" b="1" dirty="0" err="1">
+                <a:solidFill>
+                  <a:schemeClr val="tx1"/>
+                </a:solidFill>
+              </a:rPr>
+              <a:t>test</a:t>
+            </a:r>
+            <a:r>
+              <a:rPr lang="de-DE" sz="1600" b="1" dirty="0">
+                <a:solidFill>
+                  <a:schemeClr val="tx1"/>
+                </a:solidFill>
+              </a:rPr>
+              <a:t>/</a:t>
+            </a:r>
+            <a:r>
+              <a:rPr lang="de-DE" sz="1600" b="1" dirty="0" err="1">
+                <a:solidFill>
+                  <a:schemeClr val="tx1"/>
+                </a:solidFill>
+              </a:rPr>
+              <a:t>tc_xxx</a:t>
+            </a:r>
+            <a:endParaRPr lang="de-DE" sz="1600" b="1" dirty="0">
+              <a:solidFill>
+                <a:schemeClr val="tx1"/>
+              </a:solidFill>
+            </a:endParaRPr>
+          </a:p>
+        </p:txBody>
+      </p:sp>
+      <p:sp>
+        <p:nvSpPr>
+          <p:cNvPr id="21" name="Rechteck 20">
+            <a:extLst>
+              <a:ext uri="{FF2B5EF4-FFF2-40B4-BE49-F238E27FC236}">
+                <a16:creationId xmlns:a16="http://schemas.microsoft.com/office/drawing/2014/main" id="{C5C28A24-55AD-2A04-9581-A3744055823A}"/>
+              </a:ext>
+            </a:extLst>
+          </p:cNvPr>
+          <p:cNvSpPr/>
+          <p:nvPr/>
+        </p:nvSpPr>
+        <p:spPr bwMode="auto">
+          <a:xfrm>
+            <a:off x="6092283" y="2889534"/>
+            <a:ext cx="5451590" cy="347798"/>
+          </a:xfrm>
+          <a:prstGeom prst="rect">
+            <a:avLst/>
+          </a:prstGeom>
+          <a:solidFill>
+            <a:schemeClr val="accent3">
+              <a:lumMod val="20000"/>
+              <a:lumOff val="80000"/>
+            </a:schemeClr>
+          </a:solidFill>
+          <a:ln>
+            <a:noFill/>
+          </a:ln>
+          <a:effectLst/>
+        </p:spPr>
+        <p:txBody>
+          <a:bodyPr wrap="square" lIns="108000" tIns="54000" rIns="108000" bIns="54000" numCol="1" spcCol="72000" rtlCol="0" anchor="ctr">
+            <a:noAutofit/>
+          </a:bodyPr>
+          <a:lstStyle/>
+          <a:p>
+            <a:pPr>
+              <a:lnSpc>
+                <a:spcPct val="110000"/>
+              </a:lnSpc>
+              <a:spcBef>
+                <a:spcPct val="0"/>
+              </a:spcBef>
+              <a:buFont typeface="Wingdings" charset="0"/>
+              <a:buNone/>
+            </a:pPr>
+            <a:r>
+              <a:rPr lang="de-DE" sz="1600" b="1" dirty="0">
+                <a:solidFill>
+                  <a:schemeClr val="tx1"/>
+                </a:solidFill>
+              </a:rPr>
+              <a:t>+ </a:t>
+            </a:r>
+            <a:r>
+              <a:rPr lang="de-DE" sz="1600" b="1" dirty="0" err="1">
+                <a:solidFill>
+                  <a:schemeClr val="tx1"/>
+                </a:solidFill>
+              </a:rPr>
+              <a:t>doc_xxx</a:t>
+            </a:r>
+            <a:r>
+              <a:rPr lang="de-DE" sz="1600" b="1" dirty="0">
+                <a:solidFill>
+                  <a:schemeClr val="tx1"/>
+                </a:solidFill>
+              </a:rPr>
+              <a:t> – </a:t>
+            </a:r>
+            <a:r>
+              <a:rPr lang="de-DE" sz="1600" b="1" dirty="0" err="1">
+                <a:solidFill>
+                  <a:schemeClr val="tx1"/>
+                </a:solidFill>
+              </a:rPr>
+              <a:t>branch</a:t>
+            </a:r>
+            <a:r>
+              <a:rPr lang="de-DE" sz="1600" b="1" dirty="0">
+                <a:solidFill>
+                  <a:schemeClr val="tx1"/>
+                </a:solidFill>
+              </a:rPr>
+              <a:t> </a:t>
+            </a:r>
+            <a:r>
+              <a:rPr lang="de-DE" sz="1600" b="1" dirty="0" err="1">
+                <a:solidFill>
+                  <a:schemeClr val="tx1"/>
+                </a:solidFill>
+              </a:rPr>
+              <a:t>with</a:t>
+            </a:r>
+            <a:r>
+              <a:rPr lang="de-DE" sz="1600" b="1" dirty="0">
+                <a:solidFill>
+                  <a:schemeClr val="tx1"/>
+                </a:solidFill>
+              </a:rPr>
+              <a:t> tool-</a:t>
+            </a:r>
+            <a:r>
+              <a:rPr lang="de-DE" sz="1600" b="1" dirty="0" err="1">
+                <a:solidFill>
+                  <a:schemeClr val="tx1"/>
+                </a:solidFill>
+              </a:rPr>
+              <a:t>specific</a:t>
+            </a:r>
+            <a:r>
+              <a:rPr lang="de-DE" sz="1600" b="1" dirty="0">
+                <a:solidFill>
+                  <a:schemeClr val="tx1"/>
+                </a:solidFill>
+              </a:rPr>
+              <a:t> </a:t>
+            </a:r>
+            <a:r>
+              <a:rPr lang="de-DE" sz="1600" b="1" dirty="0" err="1">
+                <a:solidFill>
+                  <a:schemeClr val="tx1"/>
+                </a:solidFill>
+              </a:rPr>
+              <a:t>documentation</a:t>
+            </a:r>
+            <a:endParaRPr lang="de-DE" sz="1600" b="1" dirty="0">
+              <a:solidFill>
+                <a:schemeClr val="tx1"/>
+              </a:solidFill>
+            </a:endParaRPr>
+          </a:p>
+        </p:txBody>
+      </p:sp>
+      <p:sp>
+        <p:nvSpPr>
+          <p:cNvPr id="22" name="Rechteck 21">
+            <a:extLst>
+              <a:ext uri="{FF2B5EF4-FFF2-40B4-BE49-F238E27FC236}">
+                <a16:creationId xmlns:a16="http://schemas.microsoft.com/office/drawing/2014/main" id="{24767C15-AF31-1201-E1F5-300D822F94AD}"/>
+              </a:ext>
+            </a:extLst>
+          </p:cNvPr>
+          <p:cNvSpPr/>
+          <p:nvPr/>
+        </p:nvSpPr>
+        <p:spPr bwMode="auto">
+          <a:xfrm>
+            <a:off x="6092283" y="2493079"/>
+            <a:ext cx="5451590" cy="347798"/>
+          </a:xfrm>
+          <a:prstGeom prst="rect">
+            <a:avLst/>
+          </a:prstGeom>
+          <a:solidFill>
+            <a:schemeClr val="accent5">
+              <a:lumMod val="20000"/>
+              <a:lumOff val="80000"/>
+            </a:schemeClr>
+          </a:solidFill>
+          <a:ln>
+            <a:noFill/>
+          </a:ln>
+          <a:effectLst/>
+        </p:spPr>
+        <p:txBody>
+          <a:bodyPr wrap="square" lIns="108000" tIns="54000" rIns="108000" bIns="54000" numCol="1" spcCol="72000" rtlCol="0" anchor="ctr">
+            <a:noAutofit/>
+          </a:bodyPr>
+          <a:lstStyle/>
+          <a:p>
+            <a:pPr>
+              <a:lnSpc>
+                <a:spcPct val="110000"/>
+              </a:lnSpc>
+              <a:spcBef>
+                <a:spcPct val="0"/>
+              </a:spcBef>
+              <a:buFont typeface="Wingdings" charset="0"/>
+              <a:buNone/>
+            </a:pPr>
+            <a:r>
+              <a:rPr lang="de-DE" sz="1600" b="1" dirty="0">
+                <a:solidFill>
+                  <a:schemeClr val="tx1"/>
+                </a:solidFill>
+              </a:rPr>
+              <a:t>+ </a:t>
+            </a:r>
+            <a:r>
+              <a:rPr lang="de-DE" sz="1600" b="1" dirty="0" err="1">
+                <a:solidFill>
+                  <a:schemeClr val="tx1"/>
+                </a:solidFill>
+              </a:rPr>
+              <a:t>with</a:t>
+            </a:r>
+            <a:r>
+              <a:rPr lang="de-DE" sz="1600" b="1" dirty="0">
+                <a:solidFill>
+                  <a:schemeClr val="tx1"/>
+                </a:solidFill>
+              </a:rPr>
+              <a:t> tool-</a:t>
+            </a:r>
+            <a:r>
+              <a:rPr lang="de-DE" sz="1600" b="1" dirty="0" err="1">
+                <a:solidFill>
+                  <a:schemeClr val="tx1"/>
+                </a:solidFill>
+              </a:rPr>
+              <a:t>specific</a:t>
+            </a:r>
+            <a:r>
+              <a:rPr lang="de-DE" sz="1600" b="1" dirty="0">
+                <a:solidFill>
+                  <a:schemeClr val="tx1"/>
+                </a:solidFill>
+              </a:rPr>
+              <a:t> </a:t>
+            </a:r>
+            <a:r>
+              <a:rPr lang="de-DE" sz="1600" b="1" dirty="0" err="1">
+                <a:solidFill>
+                  <a:schemeClr val="tx1"/>
+                </a:solidFill>
+              </a:rPr>
+              <a:t>resolutions</a:t>
+            </a:r>
+            <a:r>
+              <a:rPr lang="de-DE" sz="1600" b="1" dirty="0">
+                <a:solidFill>
+                  <a:schemeClr val="tx1"/>
+                </a:solidFill>
+              </a:rPr>
+              <a:t> </a:t>
+            </a:r>
+            <a:r>
+              <a:rPr lang="de-DE" sz="1600" b="1" dirty="0" err="1">
+                <a:solidFill>
+                  <a:schemeClr val="tx1"/>
+                </a:solidFill>
+              </a:rPr>
+              <a:t>test</a:t>
+            </a:r>
+            <a:r>
+              <a:rPr lang="de-DE" sz="1600" b="1" dirty="0">
+                <a:solidFill>
+                  <a:schemeClr val="tx1"/>
+                </a:solidFill>
+              </a:rPr>
+              <a:t>/</a:t>
+            </a:r>
+            <a:r>
+              <a:rPr lang="de-DE" sz="1600" b="1" dirty="0" err="1">
+                <a:solidFill>
+                  <a:schemeClr val="tx1"/>
+                </a:solidFill>
+              </a:rPr>
+              <a:t>tc_xxx_resolution</a:t>
+            </a:r>
+            <a:endParaRPr lang="de-DE" sz="1600" b="1" dirty="0">
+              <a:solidFill>
+                <a:schemeClr val="tx1"/>
+              </a:solidFill>
+            </a:endParaRPr>
+          </a:p>
+        </p:txBody>
+      </p:sp>
+      <p:sp>
+        <p:nvSpPr>
+          <p:cNvPr id="23" name="Geschweifte Klammer links 22">
+            <a:extLst>
+              <a:ext uri="{FF2B5EF4-FFF2-40B4-BE49-F238E27FC236}">
+                <a16:creationId xmlns:a16="http://schemas.microsoft.com/office/drawing/2014/main" id="{6BD09674-CCED-162E-CD54-0A9DBDC13C93}"/>
+              </a:ext>
+            </a:extLst>
+          </p:cNvPr>
+          <p:cNvSpPr/>
+          <p:nvPr/>
+        </p:nvSpPr>
+        <p:spPr bwMode="auto">
+          <a:xfrm>
+            <a:off x="2929055" y="3314022"/>
+            <a:ext cx="375424" cy="1069048"/>
+          </a:xfrm>
+          <a:prstGeom prst="leftBrace">
+            <a:avLst>
+              <a:gd name="adj1" fmla="val 34076"/>
+              <a:gd name="adj2" fmla="val 50000"/>
+            </a:avLst>
+          </a:prstGeom>
+          <a:noFill/>
+          <a:ln w="9525" cap="flat" cmpd="sng" algn="ctr">
+            <a:solidFill>
+              <a:schemeClr val="accent1"/>
+            </a:solidFill>
+            <a:prstDash val="solid"/>
+            <a:round/>
+            <a:headEnd type="none" w="med" len="med"/>
+            <a:tailEnd type="none" w="med" len="med"/>
+          </a:ln>
+          <a:effectLst/>
+        </p:spPr>
+        <p:txBody>
+          <a:bodyPr rtlCol="0" anchor="ctr"/>
+          <a:lstStyle/>
+          <a:p>
+            <a:pPr algn="ctr"/>
+            <a:endParaRPr lang="de-DE"/>
+          </a:p>
+        </p:txBody>
+      </p:sp>
+      <p:sp>
+        <p:nvSpPr>
+          <p:cNvPr id="24" name="Geschweifte Klammer links 23">
+            <a:extLst>
+              <a:ext uri="{FF2B5EF4-FFF2-40B4-BE49-F238E27FC236}">
+                <a16:creationId xmlns:a16="http://schemas.microsoft.com/office/drawing/2014/main" id="{22DA411C-579B-9BD4-EB2F-2274B6A0030E}"/>
+              </a:ext>
+            </a:extLst>
+          </p:cNvPr>
+          <p:cNvSpPr/>
+          <p:nvPr/>
+        </p:nvSpPr>
+        <p:spPr bwMode="auto">
+          <a:xfrm>
+            <a:off x="5624105" y="2109982"/>
+            <a:ext cx="375424" cy="1117693"/>
+          </a:xfrm>
+          <a:prstGeom prst="leftBrace">
+            <a:avLst>
+              <a:gd name="adj1" fmla="val 34076"/>
+              <a:gd name="adj2" fmla="val 50000"/>
+            </a:avLst>
+          </a:prstGeom>
+          <a:noFill/>
+          <a:ln w="9525" cap="flat" cmpd="sng" algn="ctr">
+            <a:solidFill>
+              <a:schemeClr val="accent1"/>
+            </a:solidFill>
+            <a:prstDash val="solid"/>
+            <a:round/>
+            <a:headEnd type="none" w="med" len="med"/>
+            <a:tailEnd type="none" w="med" len="med"/>
+          </a:ln>
+          <a:effectLst/>
+        </p:spPr>
+        <p:txBody>
+          <a:bodyPr rtlCol="0" anchor="ctr"/>
+          <a:lstStyle/>
+          <a:p>
+            <a:pPr algn="ctr"/>
+            <a:endParaRPr lang="de-DE"/>
+          </a:p>
+        </p:txBody>
+      </p:sp>
+      <p:sp>
+        <p:nvSpPr>
+          <p:cNvPr id="25" name="Pfeil: gebogen 24">
+            <a:extLst>
+              <a:ext uri="{FF2B5EF4-FFF2-40B4-BE49-F238E27FC236}">
+                <a16:creationId xmlns:a16="http://schemas.microsoft.com/office/drawing/2014/main" id="{45B71C64-B4DE-CA58-456C-9A8BBAFF4B54}"/>
+              </a:ext>
+            </a:extLst>
+          </p:cNvPr>
+          <p:cNvSpPr/>
+          <p:nvPr/>
+        </p:nvSpPr>
+        <p:spPr bwMode="auto">
+          <a:xfrm>
+            <a:off x="2309233" y="3762673"/>
+            <a:ext cx="497160" cy="643955"/>
+          </a:xfrm>
+          <a:prstGeom prst="bentArrow">
+            <a:avLst/>
+          </a:prstGeom>
+          <a:solidFill>
+            <a:schemeClr val="accent2"/>
+          </a:solidFill>
+          <a:ln>
+            <a:noFill/>
+          </a:ln>
+          <a:effectLst/>
+          <a:extLst>
+            <a:ext uri="{91240B29-F687-4F45-9708-019B960494DF}">
+              <a14:hiddenLine xmlns:a14="http://schemas.microsoft.com/office/drawing/2010/main" w="9525">
+                <a:solidFill>
+                  <a:schemeClr val="tx1"/>
+                </a:solidFill>
+                <a:miter lim="800000"/>
+                <a:headEnd/>
+                <a:tailEnd/>
+              </a14:hiddenLine>
+            </a:ext>
+            <a:ext uri="{AF507438-7753-43E0-B8FC-AC1667EBCBE1}">
+              <a14:hiddenEffects xmlns:a14="http://schemas.microsoft.com/office/drawing/2010/main">
+                <a:effectLst>
+                  <a:outerShdw blurRad="63500" dist="38099" dir="2700000" algn="ctr" rotWithShape="0">
+                    <a:schemeClr val="bg2">
+                      <a:alpha val="74998"/>
+                    </a:schemeClr>
+                  </a:outerShdw>
+                </a:effectLst>
+              </a14:hiddenEffects>
+            </a:ext>
+          </a:extLst>
+        </p:spPr>
+        <p:txBody>
+          <a:bodyPr wrap="square" lIns="108000" tIns="54000" rIns="108000" bIns="54000" numCol="1" spcCol="72000" rtlCol="0" anchor="ctr">
+            <a:noAutofit/>
+          </a:bodyPr>
+          <a:lstStyle/>
+          <a:p>
+            <a:pPr algn="ctr">
+              <a:lnSpc>
+                <a:spcPct val="110000"/>
+              </a:lnSpc>
+              <a:spcBef>
+                <a:spcPct val="0"/>
+              </a:spcBef>
+              <a:buFont typeface="Wingdings" charset="0"/>
+              <a:buNone/>
+            </a:pPr>
+            <a:endParaRPr lang="de-DE" sz="1800" b="1" dirty="0" err="1">
+              <a:solidFill>
+                <a:schemeClr val="tx1"/>
+              </a:solidFill>
+            </a:endParaRPr>
+          </a:p>
+        </p:txBody>
+      </p:sp>
+      <p:sp>
+        <p:nvSpPr>
+          <p:cNvPr id="26" name="Pfeil: gebogen 25">
+            <a:extLst>
+              <a:ext uri="{FF2B5EF4-FFF2-40B4-BE49-F238E27FC236}">
+                <a16:creationId xmlns:a16="http://schemas.microsoft.com/office/drawing/2014/main" id="{147D7EF7-6594-806C-19C2-AADAE825FE7D}"/>
+              </a:ext>
+            </a:extLst>
+          </p:cNvPr>
+          <p:cNvSpPr/>
+          <p:nvPr/>
+        </p:nvSpPr>
+        <p:spPr bwMode="auto">
+          <a:xfrm>
+            <a:off x="5034191" y="2559960"/>
+            <a:ext cx="497160" cy="648473"/>
+          </a:xfrm>
+          <a:prstGeom prst="bentArrow">
+            <a:avLst/>
+          </a:prstGeom>
+          <a:solidFill>
+            <a:schemeClr val="accent2"/>
+          </a:solidFill>
+          <a:ln>
+            <a:noFill/>
+          </a:ln>
+          <a:effectLst/>
+          <a:extLst>
+            <a:ext uri="{91240B29-F687-4F45-9708-019B960494DF}">
+              <a14:hiddenLine xmlns:a14="http://schemas.microsoft.com/office/drawing/2010/main" w="9525">
+                <a:solidFill>
+                  <a:schemeClr val="tx1"/>
+                </a:solidFill>
+                <a:miter lim="800000"/>
+                <a:headEnd/>
+                <a:tailEnd/>
+              </a14:hiddenLine>
+            </a:ext>
+            <a:ext uri="{AF507438-7753-43E0-B8FC-AC1667EBCBE1}">
+              <a14:hiddenEffects xmlns:a14="http://schemas.microsoft.com/office/drawing/2010/main">
+                <a:effectLst>
+                  <a:outerShdw blurRad="63500" dist="38099" dir="2700000" algn="ctr" rotWithShape="0">
+                    <a:schemeClr val="bg2">
+                      <a:alpha val="74998"/>
+                    </a:schemeClr>
+                  </a:outerShdw>
+                </a:effectLst>
+              </a14:hiddenEffects>
+            </a:ext>
+          </a:extLst>
+        </p:spPr>
+        <p:txBody>
+          <a:bodyPr wrap="square" lIns="108000" tIns="54000" rIns="108000" bIns="54000" numCol="1" spcCol="72000" rtlCol="0" anchor="ctr">
+            <a:noAutofit/>
+          </a:bodyPr>
+          <a:lstStyle/>
+          <a:p>
+            <a:pPr algn="ctr">
+              <a:lnSpc>
+                <a:spcPct val="110000"/>
+              </a:lnSpc>
+              <a:spcBef>
+                <a:spcPct val="0"/>
+              </a:spcBef>
+              <a:buFont typeface="Wingdings" charset="0"/>
+              <a:buNone/>
+            </a:pPr>
+            <a:endParaRPr lang="de-DE" sz="1800" b="1" dirty="0" err="1">
+              <a:solidFill>
+                <a:schemeClr val="tx1"/>
+              </a:solidFill>
+            </a:endParaRPr>
+          </a:p>
+        </p:txBody>
+      </p:sp>
+      <p:sp>
+        <p:nvSpPr>
+          <p:cNvPr id="27" name="Textfeld 26">
+            <a:extLst>
+              <a:ext uri="{FF2B5EF4-FFF2-40B4-BE49-F238E27FC236}">
+                <a16:creationId xmlns:a16="http://schemas.microsoft.com/office/drawing/2014/main" id="{E30B2558-35E1-47B9-D0F0-B08AE05E193E}"/>
+              </a:ext>
+            </a:extLst>
+          </p:cNvPr>
+          <p:cNvSpPr txBox="1"/>
+          <p:nvPr/>
+        </p:nvSpPr>
+        <p:spPr>
+          <a:xfrm>
+            <a:off x="2103398" y="3985866"/>
+            <a:ext cx="543625" cy="218909"/>
+          </a:xfrm>
+          <a:prstGeom prst="rect">
+            <a:avLst/>
+          </a:prstGeom>
+          <a:noFill/>
+        </p:spPr>
+        <p:txBody>
+          <a:bodyPr wrap="square" lIns="0" tIns="0" rIns="0" bIns="0" rtlCol="0">
+            <a:noAutofit/>
+          </a:bodyPr>
+          <a:lstStyle/>
+          <a:p>
+            <a:pPr algn="ctr">
+              <a:lnSpc>
+                <a:spcPct val="110000"/>
+              </a:lnSpc>
+              <a:spcBef>
+                <a:spcPts val="0"/>
+              </a:spcBef>
+            </a:pPr>
+            <a:r>
+              <a:rPr lang="de-DE" sz="1400" dirty="0" err="1">
+                <a:solidFill>
+                  <a:schemeClr val="tx1"/>
+                </a:solidFill>
+              </a:rPr>
+              <a:t>fork</a:t>
+            </a:r>
+            <a:endParaRPr lang="de-DE" sz="1400" dirty="0">
+              <a:solidFill>
+                <a:schemeClr val="tx1"/>
+              </a:solidFill>
+            </a:endParaRPr>
+          </a:p>
+        </p:txBody>
+      </p:sp>
+      <p:sp>
+        <p:nvSpPr>
+          <p:cNvPr id="28" name="Textfeld 27">
+            <a:extLst>
+              <a:ext uri="{FF2B5EF4-FFF2-40B4-BE49-F238E27FC236}">
+                <a16:creationId xmlns:a16="http://schemas.microsoft.com/office/drawing/2014/main" id="{5BC52303-96F8-F639-C3B7-A25ED860F94C}"/>
+              </a:ext>
+            </a:extLst>
+          </p:cNvPr>
+          <p:cNvSpPr txBox="1"/>
+          <p:nvPr/>
+        </p:nvSpPr>
+        <p:spPr>
+          <a:xfrm>
+            <a:off x="4841422" y="2768305"/>
+            <a:ext cx="543625" cy="218909"/>
+          </a:xfrm>
+          <a:prstGeom prst="rect">
+            <a:avLst/>
+          </a:prstGeom>
+          <a:noFill/>
+        </p:spPr>
+        <p:txBody>
+          <a:bodyPr wrap="square" lIns="0" tIns="0" rIns="0" bIns="0" rtlCol="0">
+            <a:noAutofit/>
+          </a:bodyPr>
+          <a:lstStyle/>
+          <a:p>
+            <a:pPr algn="ctr">
+              <a:lnSpc>
+                <a:spcPct val="110000"/>
+              </a:lnSpc>
+              <a:spcBef>
+                <a:spcPts val="0"/>
+              </a:spcBef>
+            </a:pPr>
+            <a:r>
+              <a:rPr lang="de-DE" sz="1400" dirty="0" err="1">
+                <a:solidFill>
+                  <a:schemeClr val="tx1"/>
+                </a:solidFill>
+              </a:rPr>
+              <a:t>fork</a:t>
+            </a:r>
+            <a:endParaRPr lang="de-DE" sz="1400" dirty="0">
+              <a:solidFill>
+                <a:schemeClr val="tx1"/>
+              </a:solidFill>
+            </a:endParaRPr>
+          </a:p>
+        </p:txBody>
+      </p:sp>
+      <p:cxnSp>
+        <p:nvCxnSpPr>
+          <p:cNvPr id="30" name="Gerader Verbinder 29">
+            <a:extLst>
+              <a:ext uri="{FF2B5EF4-FFF2-40B4-BE49-F238E27FC236}">
+                <a16:creationId xmlns:a16="http://schemas.microsoft.com/office/drawing/2014/main" id="{29E9A101-E0FB-B1D2-9F47-37152D091CF1}"/>
+              </a:ext>
+            </a:extLst>
+          </p:cNvPr>
+          <p:cNvCxnSpPr/>
+          <p:nvPr/>
+        </p:nvCxnSpPr>
+        <p:spPr bwMode="auto">
+          <a:xfrm>
+            <a:off x="3427141" y="1994442"/>
+            <a:ext cx="0" cy="3076304"/>
+          </a:xfrm>
+          <a:prstGeom prst="line">
+            <a:avLst/>
+          </a:prstGeom>
+          <a:solidFill>
+            <a:schemeClr val="tx2"/>
+          </a:solidFill>
+          <a:ln w="9525" cap="flat" cmpd="sng" algn="ctr">
+            <a:solidFill>
+              <a:schemeClr val="accent1"/>
+            </a:solidFill>
+            <a:prstDash val="dash"/>
+            <a:round/>
+            <a:headEnd type="none" w="med" len="med"/>
+            <a:tailEnd type="none" w="med" len="med"/>
+          </a:ln>
+          <a:effectLst/>
+          <a:extLst>
+            <a:ext uri="{AF507438-7753-43E0-B8FC-AC1667EBCBE1}">
+              <a14:hiddenEffects xmlns:a14="http://schemas.microsoft.com/office/drawing/2010/main">
+                <a:effectLst>
+                  <a:outerShdw blurRad="63500" dist="35921" dir="2700000" algn="ctr" rotWithShape="0">
+                    <a:schemeClr val="bg2"/>
+                  </a:outerShdw>
+                </a:effectLst>
+              </a14:hiddenEffects>
+            </a:ext>
+          </a:extLst>
+        </p:spPr>
+      </p:cxnSp>
+      <p:cxnSp>
+        <p:nvCxnSpPr>
+          <p:cNvPr id="32" name="Gerader Verbinder 31">
+            <a:extLst>
+              <a:ext uri="{FF2B5EF4-FFF2-40B4-BE49-F238E27FC236}">
+                <a16:creationId xmlns:a16="http://schemas.microsoft.com/office/drawing/2014/main" id="{1F307EC3-08A7-D815-504E-DD004466CFEA}"/>
+              </a:ext>
+            </a:extLst>
+          </p:cNvPr>
+          <p:cNvCxnSpPr/>
+          <p:nvPr/>
+        </p:nvCxnSpPr>
+        <p:spPr bwMode="auto">
+          <a:xfrm>
+            <a:off x="6102892" y="1945674"/>
+            <a:ext cx="0" cy="3076304"/>
+          </a:xfrm>
+          <a:prstGeom prst="line">
+            <a:avLst/>
+          </a:prstGeom>
+          <a:solidFill>
+            <a:schemeClr val="tx2"/>
+          </a:solidFill>
+          <a:ln w="9525" cap="flat" cmpd="sng" algn="ctr">
+            <a:solidFill>
+              <a:schemeClr val="accent1"/>
+            </a:solidFill>
+            <a:prstDash val="dash"/>
+            <a:round/>
+            <a:headEnd type="none" w="med" len="med"/>
+            <a:tailEnd type="none" w="med" len="med"/>
+          </a:ln>
+          <a:effectLst/>
+          <a:extLst>
+            <a:ext uri="{AF507438-7753-43E0-B8FC-AC1667EBCBE1}">
+              <a14:hiddenEffects xmlns:a14="http://schemas.microsoft.com/office/drawing/2010/main">
+                <a:effectLst>
+                  <a:outerShdw blurRad="63500" dist="35921" dir="2700000" algn="ctr" rotWithShape="0">
+                    <a:schemeClr val="bg2"/>
+                  </a:outerShdw>
+                </a:effectLst>
+              </a14:hiddenEffects>
+            </a:ext>
+          </a:extLst>
+        </p:spPr>
+      </p:cxnSp>
+      <p:cxnSp>
+        <p:nvCxnSpPr>
+          <p:cNvPr id="33" name="Gerader Verbinder 32">
+            <a:extLst>
+              <a:ext uri="{FF2B5EF4-FFF2-40B4-BE49-F238E27FC236}">
+                <a16:creationId xmlns:a16="http://schemas.microsoft.com/office/drawing/2014/main" id="{AE5CC634-1E08-FDF6-DDBA-C5345267AFE6}"/>
+              </a:ext>
+            </a:extLst>
+          </p:cNvPr>
+          <p:cNvCxnSpPr/>
+          <p:nvPr/>
+        </p:nvCxnSpPr>
+        <p:spPr bwMode="auto">
+          <a:xfrm>
+            <a:off x="8818078" y="1945674"/>
+            <a:ext cx="0" cy="3076304"/>
+          </a:xfrm>
+          <a:prstGeom prst="line">
+            <a:avLst/>
+          </a:prstGeom>
+          <a:solidFill>
+            <a:schemeClr val="tx2"/>
+          </a:solidFill>
+          <a:ln w="9525" cap="flat" cmpd="sng" algn="ctr">
+            <a:solidFill>
+              <a:schemeClr val="accent1"/>
+            </a:solidFill>
+            <a:prstDash val="dash"/>
+            <a:round/>
+            <a:headEnd type="none" w="med" len="med"/>
+            <a:tailEnd type="none" w="med" len="med"/>
+          </a:ln>
+          <a:effectLst/>
+          <a:extLst>
+            <a:ext uri="{AF507438-7753-43E0-B8FC-AC1667EBCBE1}">
+              <a14:hiddenEffects xmlns:a14="http://schemas.microsoft.com/office/drawing/2010/main">
+                <a:effectLst>
+                  <a:outerShdw blurRad="63500" dist="35921" dir="2700000" algn="ctr" rotWithShape="0">
+                    <a:schemeClr val="bg2"/>
+                  </a:outerShdw>
+                </a:effectLst>
+              </a14:hiddenEffects>
+            </a:ext>
+          </a:extLst>
+        </p:spPr>
+      </p:cxnSp>
+      <p:sp>
+        <p:nvSpPr>
+          <p:cNvPr id="34" name="Textfeld 33">
+            <a:extLst>
+              <a:ext uri="{FF2B5EF4-FFF2-40B4-BE49-F238E27FC236}">
+                <a16:creationId xmlns:a16="http://schemas.microsoft.com/office/drawing/2014/main" id="{F17205C3-F0EF-2823-B47B-0E71AC6DB4CA}"/>
+              </a:ext>
+            </a:extLst>
+          </p:cNvPr>
+          <p:cNvSpPr txBox="1"/>
+          <p:nvPr/>
+        </p:nvSpPr>
+        <p:spPr>
+          <a:xfrm>
+            <a:off x="3866130" y="4528879"/>
+            <a:ext cx="3226420" cy="294037"/>
+          </a:xfrm>
+          <a:prstGeom prst="rect">
+            <a:avLst/>
+          </a:prstGeom>
+          <a:noFill/>
+        </p:spPr>
+        <p:txBody>
+          <a:bodyPr wrap="square" lIns="0" tIns="0" rIns="0" bIns="0" rtlCol="0">
+            <a:noAutofit/>
+          </a:bodyPr>
+          <a:lstStyle/>
+          <a:p>
+            <a:pPr>
+              <a:lnSpc>
+                <a:spcPct val="110000"/>
+              </a:lnSpc>
+              <a:spcBef>
+                <a:spcPts val="0"/>
+              </a:spcBef>
+            </a:pPr>
+            <a:r>
+              <a:rPr lang="de-DE" sz="1400" i="1" dirty="0" err="1">
+                <a:solidFill>
+                  <a:schemeClr val="tx1"/>
+                </a:solidFill>
+              </a:rPr>
+              <a:t>remains</a:t>
+            </a:r>
+            <a:r>
+              <a:rPr lang="de-DE" sz="1400" i="1" dirty="0">
+                <a:solidFill>
+                  <a:schemeClr val="tx1"/>
+                </a:solidFill>
+              </a:rPr>
+              <a:t> </a:t>
+            </a:r>
+            <a:r>
+              <a:rPr lang="de-DE" sz="1400" i="1" dirty="0" err="1">
+                <a:solidFill>
+                  <a:schemeClr val="tx1"/>
+                </a:solidFill>
+              </a:rPr>
+              <a:t>unchanged</a:t>
+            </a:r>
+            <a:endParaRPr lang="de-DE" sz="1400" i="1" dirty="0">
+              <a:solidFill>
+                <a:schemeClr val="tx1"/>
+              </a:solidFill>
+            </a:endParaRPr>
+          </a:p>
+        </p:txBody>
+      </p:sp>
+      <p:sp>
+        <p:nvSpPr>
+          <p:cNvPr id="35" name="Textfeld 34">
+            <a:extLst>
+              <a:ext uri="{FF2B5EF4-FFF2-40B4-BE49-F238E27FC236}">
+                <a16:creationId xmlns:a16="http://schemas.microsoft.com/office/drawing/2014/main" id="{4668A776-C892-621F-8C5E-BB155D2EF81B}"/>
+              </a:ext>
+            </a:extLst>
+          </p:cNvPr>
+          <p:cNvSpPr txBox="1"/>
+          <p:nvPr/>
+        </p:nvSpPr>
+        <p:spPr>
+          <a:xfrm>
+            <a:off x="3944188" y="1557276"/>
+            <a:ext cx="1535152" cy="347798"/>
+          </a:xfrm>
+          <a:prstGeom prst="rect">
+            <a:avLst/>
+          </a:prstGeom>
+          <a:noFill/>
+        </p:spPr>
+        <p:txBody>
+          <a:bodyPr wrap="square" lIns="0" tIns="0" rIns="0" bIns="0" rtlCol="0">
+            <a:noAutofit/>
+          </a:bodyPr>
+          <a:lstStyle/>
+          <a:p>
+            <a:pPr algn="ctr">
+              <a:lnSpc>
+                <a:spcPct val="110000"/>
+              </a:lnSpc>
+              <a:spcBef>
+                <a:spcPts val="0"/>
+              </a:spcBef>
+            </a:pPr>
+            <a:r>
+              <a:rPr lang="de-DE" sz="1400" dirty="0" err="1">
+                <a:solidFill>
+                  <a:schemeClr val="tx1"/>
+                </a:solidFill>
+              </a:rPr>
+              <a:t>theory</a:t>
+            </a:r>
+            <a:endParaRPr lang="de-DE" sz="1400" dirty="0">
+              <a:solidFill>
+                <a:schemeClr val="tx1"/>
+              </a:solidFill>
+            </a:endParaRPr>
+          </a:p>
+        </p:txBody>
+      </p:sp>
+      <p:sp>
+        <p:nvSpPr>
+          <p:cNvPr id="36" name="Textfeld 35">
+            <a:extLst>
+              <a:ext uri="{FF2B5EF4-FFF2-40B4-BE49-F238E27FC236}">
+                <a16:creationId xmlns:a16="http://schemas.microsoft.com/office/drawing/2014/main" id="{2497DE39-1CE5-9773-9FF0-64E844BCD008}"/>
+              </a:ext>
+            </a:extLst>
+          </p:cNvPr>
+          <p:cNvSpPr txBox="1"/>
+          <p:nvPr/>
+        </p:nvSpPr>
+        <p:spPr>
+          <a:xfrm>
+            <a:off x="6717931" y="1532284"/>
+            <a:ext cx="1535152" cy="347798"/>
+          </a:xfrm>
+          <a:prstGeom prst="rect">
+            <a:avLst/>
+          </a:prstGeom>
+          <a:noFill/>
+        </p:spPr>
+        <p:txBody>
+          <a:bodyPr wrap="square" lIns="0" tIns="0" rIns="0" bIns="0" rtlCol="0">
+            <a:noAutofit/>
+          </a:bodyPr>
+          <a:lstStyle/>
+          <a:p>
+            <a:pPr algn="ctr">
+              <a:lnSpc>
+                <a:spcPct val="110000"/>
+              </a:lnSpc>
+              <a:spcBef>
+                <a:spcPts val="0"/>
+              </a:spcBef>
+            </a:pPr>
+            <a:r>
+              <a:rPr lang="de-DE" sz="1400" dirty="0" err="1">
+                <a:solidFill>
+                  <a:schemeClr val="tx1"/>
+                </a:solidFill>
+              </a:rPr>
+              <a:t>practice</a:t>
+            </a:r>
+            <a:endParaRPr lang="de-DE" sz="1400" dirty="0">
+              <a:solidFill>
+                <a:schemeClr val="tx1"/>
+              </a:solidFill>
+            </a:endParaRPr>
+          </a:p>
+        </p:txBody>
+      </p:sp>
+      <p:sp>
+        <p:nvSpPr>
+          <p:cNvPr id="39" name="Textfeld 38">
+            <a:extLst>
+              <a:ext uri="{FF2B5EF4-FFF2-40B4-BE49-F238E27FC236}">
+                <a16:creationId xmlns:a16="http://schemas.microsoft.com/office/drawing/2014/main" id="{BF75C144-E0A3-D769-869F-EEC49A2B3D0A}"/>
+              </a:ext>
+            </a:extLst>
+          </p:cNvPr>
+          <p:cNvSpPr txBox="1"/>
+          <p:nvPr/>
+        </p:nvSpPr>
+        <p:spPr>
+          <a:xfrm>
+            <a:off x="3014939" y="4913469"/>
+            <a:ext cx="817757" cy="260195"/>
+          </a:xfrm>
+          <a:prstGeom prst="rect">
+            <a:avLst/>
+          </a:prstGeom>
+          <a:noFill/>
+        </p:spPr>
+        <p:txBody>
+          <a:bodyPr wrap="square" lIns="0" tIns="0" rIns="0" bIns="0" rtlCol="0">
+            <a:noAutofit/>
+          </a:bodyPr>
+          <a:lstStyle/>
+          <a:p>
+            <a:pPr algn="ctr">
+              <a:lnSpc>
+                <a:spcPct val="110000"/>
+              </a:lnSpc>
+              <a:spcBef>
+                <a:spcPts val="0"/>
+              </a:spcBef>
+            </a:pPr>
+            <a:r>
+              <a:rPr lang="de-DE" sz="1400" dirty="0">
+                <a:solidFill>
+                  <a:schemeClr val="tx1"/>
+                </a:solidFill>
+              </a:rPr>
+              <a:t>1:1</a:t>
+            </a:r>
+          </a:p>
+        </p:txBody>
+      </p:sp>
+      <p:sp>
+        <p:nvSpPr>
+          <p:cNvPr id="40" name="Textfeld 39">
+            <a:extLst>
+              <a:ext uri="{FF2B5EF4-FFF2-40B4-BE49-F238E27FC236}">
+                <a16:creationId xmlns:a16="http://schemas.microsoft.com/office/drawing/2014/main" id="{F7DC6818-69D4-0D48-A58C-FFF0E1EBEB6B}"/>
+              </a:ext>
+            </a:extLst>
+          </p:cNvPr>
+          <p:cNvSpPr txBox="1"/>
+          <p:nvPr/>
+        </p:nvSpPr>
+        <p:spPr>
+          <a:xfrm>
+            <a:off x="5698272" y="4906693"/>
+            <a:ext cx="817757" cy="260195"/>
+          </a:xfrm>
+          <a:prstGeom prst="rect">
+            <a:avLst/>
+          </a:prstGeom>
+          <a:noFill/>
+        </p:spPr>
+        <p:txBody>
+          <a:bodyPr wrap="square" lIns="0" tIns="0" rIns="0" bIns="0" rtlCol="0">
+            <a:noAutofit/>
+          </a:bodyPr>
+          <a:lstStyle/>
+          <a:p>
+            <a:pPr algn="ctr">
+              <a:lnSpc>
+                <a:spcPct val="110000"/>
+              </a:lnSpc>
+              <a:spcBef>
+                <a:spcPts val="0"/>
+              </a:spcBef>
+            </a:pPr>
+            <a:r>
+              <a:rPr lang="de-DE" sz="1400" dirty="0">
+                <a:solidFill>
+                  <a:schemeClr val="tx1"/>
+                </a:solidFill>
+              </a:rPr>
+              <a:t>1:n</a:t>
+            </a:r>
+          </a:p>
+        </p:txBody>
+      </p:sp>
+      <p:sp>
+        <p:nvSpPr>
+          <p:cNvPr id="41" name="Textfeld 40">
+            <a:extLst>
+              <a:ext uri="{FF2B5EF4-FFF2-40B4-BE49-F238E27FC236}">
+                <a16:creationId xmlns:a16="http://schemas.microsoft.com/office/drawing/2014/main" id="{BA21C903-2649-C259-08B9-563F85501DDA}"/>
+              </a:ext>
+            </a:extLst>
+          </p:cNvPr>
+          <p:cNvSpPr txBox="1"/>
+          <p:nvPr/>
+        </p:nvSpPr>
+        <p:spPr>
+          <a:xfrm>
+            <a:off x="8409199" y="4903285"/>
+            <a:ext cx="817757" cy="260195"/>
+          </a:xfrm>
+          <a:prstGeom prst="rect">
+            <a:avLst/>
+          </a:prstGeom>
+          <a:noFill/>
+        </p:spPr>
+        <p:txBody>
+          <a:bodyPr wrap="square" lIns="0" tIns="0" rIns="0" bIns="0" rtlCol="0">
+            <a:noAutofit/>
+          </a:bodyPr>
+          <a:lstStyle/>
+          <a:p>
+            <a:pPr algn="ctr">
+              <a:lnSpc>
+                <a:spcPct val="110000"/>
+              </a:lnSpc>
+              <a:spcBef>
+                <a:spcPts val="0"/>
+              </a:spcBef>
+            </a:pPr>
+            <a:r>
+              <a:rPr lang="de-DE" sz="1400" dirty="0">
+                <a:solidFill>
+                  <a:schemeClr val="tx1"/>
+                </a:solidFill>
+              </a:rPr>
+              <a:t>1:n</a:t>
+            </a:r>
+          </a:p>
+        </p:txBody>
+      </p:sp>
+      <p:sp>
+        <p:nvSpPr>
+          <p:cNvPr id="42" name="Textfeld 41">
+            <a:extLst>
+              <a:ext uri="{FF2B5EF4-FFF2-40B4-BE49-F238E27FC236}">
+                <a16:creationId xmlns:a16="http://schemas.microsoft.com/office/drawing/2014/main" id="{9176482B-CFD4-69B0-5F1C-E7FBF34C2E96}"/>
+              </a:ext>
+            </a:extLst>
+          </p:cNvPr>
+          <p:cNvSpPr txBox="1"/>
+          <p:nvPr/>
+        </p:nvSpPr>
+        <p:spPr>
+          <a:xfrm>
+            <a:off x="847493" y="5727506"/>
+            <a:ext cx="2579648" cy="368493"/>
+          </a:xfrm>
+          <a:prstGeom prst="rect">
+            <a:avLst/>
+          </a:prstGeom>
+          <a:noFill/>
+        </p:spPr>
+        <p:txBody>
+          <a:bodyPr wrap="square" lIns="0" tIns="0" rIns="0" bIns="0" rtlCol="0">
+            <a:noAutofit/>
+          </a:bodyPr>
+          <a:lstStyle/>
+          <a:p>
+            <a:pPr algn="ctr">
+              <a:lnSpc>
+                <a:spcPct val="110000"/>
+              </a:lnSpc>
+              <a:spcBef>
+                <a:spcPts val="0"/>
+              </a:spcBef>
+            </a:pPr>
+            <a:r>
+              <a:rPr lang="de-DE" sz="1100" dirty="0">
+                <a:solidFill>
+                  <a:schemeClr val="tx1"/>
+                </a:solidFill>
+                <a:hlinkClick r:id="rId2"/>
+              </a:rPr>
+              <a:t>https://github.com/golang/example</a:t>
+            </a:r>
+            <a:r>
+              <a:rPr lang="de-DE" sz="1100" dirty="0">
+                <a:solidFill>
+                  <a:schemeClr val="tx1"/>
+                </a:solidFill>
+              </a:rPr>
+              <a:t> </a:t>
+            </a:r>
+          </a:p>
+        </p:txBody>
+      </p:sp>
+      <p:sp>
+        <p:nvSpPr>
+          <p:cNvPr id="43" name="Textfeld 42">
+            <a:extLst>
+              <a:ext uri="{FF2B5EF4-FFF2-40B4-BE49-F238E27FC236}">
+                <a16:creationId xmlns:a16="http://schemas.microsoft.com/office/drawing/2014/main" id="{67C32A0F-91A6-5F34-66F6-C8480731A619}"/>
+              </a:ext>
+            </a:extLst>
+          </p:cNvPr>
+          <p:cNvSpPr txBox="1"/>
+          <p:nvPr/>
+        </p:nvSpPr>
+        <p:spPr>
+          <a:xfrm>
+            <a:off x="706248" y="5480476"/>
+            <a:ext cx="2579648" cy="368493"/>
+          </a:xfrm>
+          <a:prstGeom prst="rect">
+            <a:avLst/>
+          </a:prstGeom>
+          <a:noFill/>
+        </p:spPr>
+        <p:txBody>
+          <a:bodyPr wrap="square" lIns="0" tIns="0" rIns="0" bIns="0" rtlCol="0">
+            <a:noAutofit/>
+          </a:bodyPr>
+          <a:lstStyle/>
+          <a:p>
+            <a:pPr>
+              <a:lnSpc>
+                <a:spcPct val="110000"/>
+              </a:lnSpc>
+              <a:spcBef>
+                <a:spcPts val="0"/>
+              </a:spcBef>
+            </a:pPr>
+            <a:r>
+              <a:rPr lang="de-DE" sz="1100" dirty="0" err="1">
+                <a:solidFill>
+                  <a:schemeClr val="tx1"/>
+                </a:solidFill>
+              </a:rPr>
+              <a:t>Example</a:t>
+            </a:r>
+            <a:r>
+              <a:rPr lang="de-DE" sz="1100" dirty="0">
+                <a:solidFill>
+                  <a:schemeClr val="tx1"/>
+                </a:solidFill>
+              </a:rPr>
+              <a:t>:</a:t>
+            </a:r>
+          </a:p>
+        </p:txBody>
+      </p:sp>
+      <p:sp>
+        <p:nvSpPr>
+          <p:cNvPr id="44" name="Textfeld 43">
+            <a:extLst>
+              <a:ext uri="{FF2B5EF4-FFF2-40B4-BE49-F238E27FC236}">
+                <a16:creationId xmlns:a16="http://schemas.microsoft.com/office/drawing/2014/main" id="{CF2A935D-6B3D-A38A-8772-A25C2BBB2DD0}"/>
+              </a:ext>
+            </a:extLst>
+          </p:cNvPr>
+          <p:cNvSpPr txBox="1"/>
+          <p:nvPr/>
+        </p:nvSpPr>
+        <p:spPr>
+          <a:xfrm>
+            <a:off x="3705247" y="5727506"/>
+            <a:ext cx="2294282" cy="368493"/>
+          </a:xfrm>
+          <a:prstGeom prst="rect">
+            <a:avLst/>
+          </a:prstGeom>
+          <a:noFill/>
+        </p:spPr>
+        <p:txBody>
+          <a:bodyPr wrap="square" lIns="0" tIns="0" rIns="0" bIns="0" rtlCol="0">
+            <a:noAutofit/>
+          </a:bodyPr>
+          <a:lstStyle/>
+          <a:p>
+            <a:pPr algn="ctr">
+              <a:lnSpc>
+                <a:spcPct val="110000"/>
+              </a:lnSpc>
+              <a:spcBef>
+                <a:spcPts val="0"/>
+              </a:spcBef>
+            </a:pPr>
+            <a:r>
+              <a:rPr lang="de-DE" sz="1100" dirty="0">
+                <a:solidFill>
+                  <a:schemeClr val="tx1"/>
+                </a:solidFill>
+                <a:hlinkClick r:id="rId3"/>
+              </a:rPr>
+              <a:t>https://github.com/Open-Source-Compliance/Go-Dummy</a:t>
+            </a:r>
+            <a:r>
+              <a:rPr lang="de-DE" sz="1100" dirty="0">
+                <a:solidFill>
+                  <a:schemeClr val="tx1"/>
+                </a:solidFill>
+              </a:rPr>
+              <a:t> (WIP)</a:t>
+            </a:r>
+          </a:p>
+        </p:txBody>
+      </p:sp>
+      <p:sp>
+        <p:nvSpPr>
+          <p:cNvPr id="45" name="Textfeld 44">
+            <a:extLst>
+              <a:ext uri="{FF2B5EF4-FFF2-40B4-BE49-F238E27FC236}">
+                <a16:creationId xmlns:a16="http://schemas.microsoft.com/office/drawing/2014/main" id="{1C74B601-6057-0A6D-07DF-04F599A68FF1}"/>
+              </a:ext>
+            </a:extLst>
+          </p:cNvPr>
+          <p:cNvSpPr txBox="1"/>
+          <p:nvPr/>
+        </p:nvSpPr>
+        <p:spPr>
+          <a:xfrm>
+            <a:off x="6299937" y="5727506"/>
+            <a:ext cx="2294282" cy="368493"/>
+          </a:xfrm>
+          <a:prstGeom prst="rect">
+            <a:avLst/>
+          </a:prstGeom>
+          <a:noFill/>
+        </p:spPr>
+        <p:txBody>
+          <a:bodyPr wrap="square" lIns="0" tIns="0" rIns="0" bIns="0" rtlCol="0">
+            <a:noAutofit/>
+          </a:bodyPr>
+          <a:lstStyle/>
+          <a:p>
+            <a:pPr algn="ctr">
+              <a:lnSpc>
+                <a:spcPct val="110000"/>
+              </a:lnSpc>
+              <a:spcBef>
+                <a:spcPts val="0"/>
+              </a:spcBef>
+            </a:pPr>
+            <a:r>
+              <a:rPr lang="de-DE" sz="1100" dirty="0">
+                <a:solidFill>
+                  <a:schemeClr val="tx1"/>
+                </a:solidFill>
+                <a:hlinkClick r:id="rId4"/>
+              </a:rPr>
+              <a:t>https://github.com/eclipse-apoapsis/Go-Dummy</a:t>
+            </a:r>
+            <a:r>
+              <a:rPr lang="de-DE" sz="1100" dirty="0">
+                <a:solidFill>
+                  <a:schemeClr val="tx1"/>
+                </a:solidFill>
+              </a:rPr>
+              <a:t> (</a:t>
+            </a:r>
+            <a:r>
+              <a:rPr lang="de-DE" sz="1100" dirty="0" err="1">
+                <a:solidFill>
+                  <a:schemeClr val="tx1"/>
+                </a:solidFill>
+              </a:rPr>
+              <a:t>planned</a:t>
+            </a:r>
+            <a:r>
+              <a:rPr lang="de-DE" sz="1100" dirty="0">
+                <a:solidFill>
+                  <a:schemeClr val="tx1"/>
+                </a:solidFill>
+              </a:rPr>
+              <a:t>)</a:t>
+            </a:r>
+          </a:p>
+        </p:txBody>
+      </p:sp>
+      <p:sp>
+        <p:nvSpPr>
+          <p:cNvPr id="47" name="Rechteck 46">
+            <a:extLst>
+              <a:ext uri="{FF2B5EF4-FFF2-40B4-BE49-F238E27FC236}">
+                <a16:creationId xmlns:a16="http://schemas.microsoft.com/office/drawing/2014/main" id="{EFE46A0F-6902-249B-43AB-3FC2BFF83863}"/>
+              </a:ext>
+            </a:extLst>
+          </p:cNvPr>
+          <p:cNvSpPr/>
+          <p:nvPr/>
+        </p:nvSpPr>
+        <p:spPr bwMode="auto">
+          <a:xfrm>
+            <a:off x="6102892" y="2094791"/>
+            <a:ext cx="5451590" cy="347798"/>
+          </a:xfrm>
+          <a:prstGeom prst="rect">
+            <a:avLst/>
+          </a:prstGeom>
+          <a:solidFill>
+            <a:schemeClr val="accent5">
+              <a:lumMod val="20000"/>
+              <a:lumOff val="80000"/>
+            </a:schemeClr>
+          </a:solidFill>
+          <a:ln>
+            <a:noFill/>
+          </a:ln>
+          <a:effectLst/>
+        </p:spPr>
+        <p:txBody>
+          <a:bodyPr wrap="square" lIns="108000" tIns="54000" rIns="108000" bIns="54000" numCol="1" spcCol="72000" rtlCol="0" anchor="ctr">
+            <a:noAutofit/>
+          </a:bodyPr>
+          <a:lstStyle/>
+          <a:p>
+            <a:pPr>
+              <a:lnSpc>
+                <a:spcPct val="110000"/>
+              </a:lnSpc>
+              <a:spcBef>
+                <a:spcPct val="0"/>
+              </a:spcBef>
+              <a:buFont typeface="Wingdings" charset="0"/>
+              <a:buNone/>
+            </a:pPr>
+            <a:r>
+              <a:rPr lang="de-DE" sz="1600" b="1" dirty="0">
+                <a:solidFill>
+                  <a:schemeClr val="tx1"/>
+                </a:solidFill>
+              </a:rPr>
+              <a:t>+ </a:t>
+            </a:r>
+            <a:r>
+              <a:rPr lang="de-DE" sz="1600" b="1" dirty="0" err="1">
+                <a:solidFill>
+                  <a:schemeClr val="tx1"/>
+                </a:solidFill>
+              </a:rPr>
+              <a:t>with</a:t>
+            </a:r>
+            <a:r>
+              <a:rPr lang="de-DE" sz="1600" b="1" dirty="0">
+                <a:solidFill>
+                  <a:schemeClr val="tx1"/>
+                </a:solidFill>
+              </a:rPr>
+              <a:t> tool-</a:t>
+            </a:r>
+            <a:r>
+              <a:rPr lang="de-DE" sz="1600" b="1" dirty="0" err="1">
+                <a:solidFill>
+                  <a:schemeClr val="tx1"/>
+                </a:solidFill>
+              </a:rPr>
+              <a:t>specific</a:t>
+            </a:r>
+            <a:r>
+              <a:rPr lang="de-DE" sz="1600" b="1" dirty="0">
+                <a:solidFill>
+                  <a:schemeClr val="tx1"/>
+                </a:solidFill>
+              </a:rPr>
+              <a:t> auto-tests </a:t>
+            </a:r>
+            <a:r>
+              <a:rPr lang="de-DE" sz="1600" b="1" dirty="0" err="1">
+                <a:solidFill>
+                  <a:schemeClr val="tx1"/>
+                </a:solidFill>
+              </a:rPr>
+              <a:t>test</a:t>
+            </a:r>
+            <a:r>
+              <a:rPr lang="de-DE" sz="1600" b="1" dirty="0">
+                <a:solidFill>
+                  <a:schemeClr val="tx1"/>
+                </a:solidFill>
+              </a:rPr>
+              <a:t>/</a:t>
+            </a:r>
+            <a:r>
+              <a:rPr lang="de-DE" sz="1600" b="1" dirty="0" err="1">
+                <a:solidFill>
+                  <a:schemeClr val="tx1"/>
+                </a:solidFill>
+              </a:rPr>
+              <a:t>tc_xxx_auto</a:t>
+            </a:r>
+            <a:endParaRPr lang="de-DE" sz="1600" b="1" dirty="0">
+              <a:solidFill>
+                <a:schemeClr val="tx1"/>
+              </a:solidFill>
+            </a:endParaRPr>
+          </a:p>
+        </p:txBody>
+      </p:sp>
+      <p:sp>
+        <p:nvSpPr>
+          <p:cNvPr id="48" name="Rechteck 47">
+            <a:extLst>
+              <a:ext uri="{FF2B5EF4-FFF2-40B4-BE49-F238E27FC236}">
+                <a16:creationId xmlns:a16="http://schemas.microsoft.com/office/drawing/2014/main" id="{C545E216-2258-4C66-8F1B-A0980E1C0A70}"/>
+              </a:ext>
+            </a:extLst>
+          </p:cNvPr>
+          <p:cNvSpPr/>
+          <p:nvPr/>
+        </p:nvSpPr>
+        <p:spPr bwMode="auto">
+          <a:xfrm>
+            <a:off x="8802029" y="1706183"/>
+            <a:ext cx="2741844" cy="347798"/>
+          </a:xfrm>
+          <a:prstGeom prst="rect">
+            <a:avLst/>
+          </a:prstGeom>
+          <a:solidFill>
+            <a:schemeClr val="accent5">
+              <a:lumMod val="20000"/>
+              <a:lumOff val="80000"/>
+            </a:schemeClr>
+          </a:solidFill>
+          <a:ln>
+            <a:noFill/>
+          </a:ln>
+          <a:effectLst/>
+        </p:spPr>
+        <p:txBody>
+          <a:bodyPr wrap="square" lIns="108000" tIns="54000" rIns="108000" bIns="54000" numCol="1" spcCol="72000" rtlCol="0" anchor="ctr">
+            <a:noAutofit/>
+          </a:bodyPr>
+          <a:lstStyle/>
+          <a:p>
+            <a:pPr>
+              <a:lnSpc>
+                <a:spcPct val="110000"/>
+              </a:lnSpc>
+              <a:spcBef>
+                <a:spcPct val="0"/>
+              </a:spcBef>
+              <a:buFont typeface="Wingdings" charset="0"/>
+              <a:buNone/>
+            </a:pPr>
+            <a:r>
+              <a:rPr lang="de-DE" sz="1600" b="1" dirty="0">
+                <a:solidFill>
+                  <a:schemeClr val="tx1"/>
+                </a:solidFill>
+              </a:rPr>
+              <a:t>+ </a:t>
+            </a:r>
+            <a:r>
+              <a:rPr lang="de-DE" sz="1600" b="1" dirty="0" err="1">
+                <a:solidFill>
+                  <a:schemeClr val="tx1"/>
+                </a:solidFill>
+              </a:rPr>
+              <a:t>local</a:t>
+            </a:r>
+            <a:r>
+              <a:rPr lang="de-DE" sz="1600" b="1" dirty="0">
+                <a:solidFill>
+                  <a:schemeClr val="tx1"/>
+                </a:solidFill>
+              </a:rPr>
+              <a:t> </a:t>
+            </a:r>
+            <a:r>
+              <a:rPr lang="de-DE" sz="1600" b="1" dirty="0" err="1">
+                <a:solidFill>
+                  <a:schemeClr val="tx1"/>
+                </a:solidFill>
+              </a:rPr>
+              <a:t>config</a:t>
+            </a:r>
+            <a:endParaRPr lang="de-DE" sz="1600" b="1" dirty="0">
+              <a:solidFill>
+                <a:schemeClr val="tx1"/>
+              </a:solidFill>
+            </a:endParaRPr>
+          </a:p>
+        </p:txBody>
+      </p:sp>
+      <p:sp>
+        <p:nvSpPr>
+          <p:cNvPr id="49" name="Pfeil: gebogen 48">
+            <a:extLst>
+              <a:ext uri="{FF2B5EF4-FFF2-40B4-BE49-F238E27FC236}">
+                <a16:creationId xmlns:a16="http://schemas.microsoft.com/office/drawing/2014/main" id="{21E5E05D-BFE2-A0EF-5CE4-4F01C7C17025}"/>
+              </a:ext>
+            </a:extLst>
+          </p:cNvPr>
+          <p:cNvSpPr/>
+          <p:nvPr/>
+        </p:nvSpPr>
+        <p:spPr bwMode="auto">
+          <a:xfrm>
+            <a:off x="8482361" y="1815818"/>
+            <a:ext cx="264629" cy="245667"/>
+          </a:xfrm>
+          <a:prstGeom prst="bentArrow">
+            <a:avLst/>
+          </a:prstGeom>
+          <a:solidFill>
+            <a:schemeClr val="accent2"/>
+          </a:solidFill>
+          <a:ln>
+            <a:noFill/>
+          </a:ln>
+          <a:effectLst/>
+          <a:extLst>
+            <a:ext uri="{91240B29-F687-4F45-9708-019B960494DF}">
+              <a14:hiddenLine xmlns:a14="http://schemas.microsoft.com/office/drawing/2010/main" w="9525">
+                <a:solidFill>
+                  <a:schemeClr val="tx1"/>
+                </a:solidFill>
+                <a:miter lim="800000"/>
+                <a:headEnd/>
+                <a:tailEnd/>
+              </a14:hiddenLine>
+            </a:ext>
+            <a:ext uri="{AF507438-7753-43E0-B8FC-AC1667EBCBE1}">
+              <a14:hiddenEffects xmlns:a14="http://schemas.microsoft.com/office/drawing/2010/main">
+                <a:effectLst>
+                  <a:outerShdw blurRad="63500" dist="38099" dir="2700000" algn="ctr" rotWithShape="0">
+                    <a:schemeClr val="bg2">
+                      <a:alpha val="74998"/>
+                    </a:schemeClr>
+                  </a:outerShdw>
+                </a:effectLst>
+              </a14:hiddenEffects>
+            </a:ext>
+          </a:extLst>
+        </p:spPr>
+        <p:txBody>
+          <a:bodyPr wrap="square" lIns="108000" tIns="54000" rIns="108000" bIns="54000" numCol="1" spcCol="72000" rtlCol="0" anchor="ctr">
+            <a:noAutofit/>
+          </a:bodyPr>
+          <a:lstStyle/>
+          <a:p>
+            <a:pPr algn="ctr">
+              <a:lnSpc>
+                <a:spcPct val="110000"/>
+              </a:lnSpc>
+              <a:spcBef>
+                <a:spcPct val="0"/>
+              </a:spcBef>
+              <a:buFont typeface="Wingdings" charset="0"/>
+              <a:buNone/>
+            </a:pPr>
+            <a:endParaRPr lang="de-DE" sz="1800" b="1" dirty="0" err="1">
+              <a:solidFill>
+                <a:schemeClr val="tx1"/>
+              </a:solidFill>
+            </a:endParaRPr>
+          </a:p>
+        </p:txBody>
+      </p:sp>
+      <p:sp>
+        <p:nvSpPr>
+          <p:cNvPr id="50" name="Textfeld 49">
+            <a:extLst>
+              <a:ext uri="{FF2B5EF4-FFF2-40B4-BE49-F238E27FC236}">
+                <a16:creationId xmlns:a16="http://schemas.microsoft.com/office/drawing/2014/main" id="{B3D30505-0BA7-B2D4-FAB4-4F4DE166D584}"/>
+              </a:ext>
+            </a:extLst>
+          </p:cNvPr>
+          <p:cNvSpPr txBox="1"/>
+          <p:nvPr/>
+        </p:nvSpPr>
+        <p:spPr>
+          <a:xfrm>
+            <a:off x="8256792" y="1835072"/>
+            <a:ext cx="543625" cy="218909"/>
+          </a:xfrm>
+          <a:prstGeom prst="rect">
+            <a:avLst/>
+          </a:prstGeom>
+          <a:noFill/>
+        </p:spPr>
+        <p:txBody>
+          <a:bodyPr wrap="square" lIns="0" tIns="0" rIns="0" bIns="0" rtlCol="0">
+            <a:noAutofit/>
+          </a:bodyPr>
+          <a:lstStyle/>
+          <a:p>
+            <a:pPr algn="ctr">
+              <a:lnSpc>
+                <a:spcPct val="110000"/>
+              </a:lnSpc>
+              <a:spcBef>
+                <a:spcPts val="0"/>
+              </a:spcBef>
+            </a:pPr>
+            <a:r>
+              <a:rPr lang="de-DE" sz="1400" dirty="0" err="1">
+                <a:solidFill>
+                  <a:schemeClr val="tx1"/>
+                </a:solidFill>
+              </a:rPr>
+              <a:t>fork</a:t>
+            </a:r>
+            <a:endParaRPr lang="de-DE" sz="1400" dirty="0">
+              <a:solidFill>
+                <a:schemeClr val="tx1"/>
+              </a:solidFill>
+            </a:endParaRPr>
+          </a:p>
+        </p:txBody>
+      </p:sp>
+      <p:sp>
+        <p:nvSpPr>
+          <p:cNvPr id="51" name="Textfeld 50">
+            <a:extLst>
+              <a:ext uri="{FF2B5EF4-FFF2-40B4-BE49-F238E27FC236}">
+                <a16:creationId xmlns:a16="http://schemas.microsoft.com/office/drawing/2014/main" id="{60F7C56F-C172-5532-458B-DCD3AA9E9049}"/>
+              </a:ext>
+            </a:extLst>
+          </p:cNvPr>
+          <p:cNvSpPr txBox="1"/>
+          <p:nvPr/>
+        </p:nvSpPr>
+        <p:spPr>
+          <a:xfrm>
+            <a:off x="9025810" y="5744504"/>
+            <a:ext cx="2294282" cy="368493"/>
+          </a:xfrm>
+          <a:prstGeom prst="rect">
+            <a:avLst/>
+          </a:prstGeom>
+          <a:noFill/>
+        </p:spPr>
+        <p:txBody>
+          <a:bodyPr wrap="square" lIns="0" tIns="0" rIns="0" bIns="0" rtlCol="0">
+            <a:noAutofit/>
+          </a:bodyPr>
+          <a:lstStyle/>
+          <a:p>
+            <a:pPr algn="ctr">
+              <a:lnSpc>
+                <a:spcPct val="110000"/>
+              </a:lnSpc>
+              <a:spcBef>
+                <a:spcPts val="0"/>
+              </a:spcBef>
+            </a:pPr>
+            <a:r>
+              <a:rPr lang="de-DE" sz="1100" dirty="0" err="1">
+                <a:solidFill>
+                  <a:schemeClr val="tx1"/>
+                </a:solidFill>
+              </a:rPr>
+              <a:t>my</a:t>
+            </a:r>
+            <a:r>
+              <a:rPr lang="de-DE" sz="1100" dirty="0">
+                <a:solidFill>
+                  <a:schemeClr val="tx1"/>
+                </a:solidFill>
+              </a:rPr>
+              <a:t> </a:t>
+            </a:r>
+            <a:r>
+              <a:rPr lang="de-DE" sz="1100" dirty="0" err="1">
+                <a:solidFill>
+                  <a:schemeClr val="tx1"/>
+                </a:solidFill>
+              </a:rPr>
+              <a:t>local</a:t>
+            </a:r>
+            <a:r>
+              <a:rPr lang="de-DE" sz="1100" dirty="0">
+                <a:solidFill>
+                  <a:schemeClr val="tx1"/>
+                </a:solidFill>
+              </a:rPr>
+              <a:t> </a:t>
+            </a:r>
+            <a:r>
+              <a:rPr lang="de-DE" sz="1100" dirty="0" err="1">
+                <a:solidFill>
+                  <a:schemeClr val="tx1"/>
+                </a:solidFill>
+              </a:rPr>
+              <a:t>go-reference-repo</a:t>
+            </a:r>
+            <a:r>
+              <a:rPr lang="de-DE" sz="1100" dirty="0">
+                <a:solidFill>
+                  <a:schemeClr val="tx1"/>
+                </a:solidFill>
+              </a:rPr>
+              <a:t> (</a:t>
+            </a:r>
+            <a:r>
+              <a:rPr lang="de-DE" sz="1100" dirty="0" err="1">
+                <a:solidFill>
+                  <a:schemeClr val="tx1"/>
+                </a:solidFill>
+              </a:rPr>
+              <a:t>goal</a:t>
+            </a:r>
+            <a:r>
+              <a:rPr lang="de-DE" sz="1100" dirty="0">
+                <a:solidFill>
+                  <a:schemeClr val="tx1"/>
+                </a:solidFill>
+              </a:rPr>
+              <a:t>)</a:t>
+            </a:r>
+          </a:p>
+        </p:txBody>
+      </p:sp>
+    </p:spTree>
+    <p:extLst>
+      <p:ext uri="{BB962C8B-B14F-4D97-AF65-F5344CB8AC3E}">
+        <p14:creationId xmlns:p14="http://schemas.microsoft.com/office/powerpoint/2010/main" val="4246009762"/>
+      </p:ext>
+    </p:extLst>
+  </p:cSld>
+  <p:clrMapOvr>
+    <a:masterClrMapping/>
+  </p:clrMapOvr>
+</p:sld>
+</file>
+
+<file path=ppt/slides/slide12.xml><?xml version="1.0" encoding="utf-8"?>
+<p:sld xmlns:a="http://schemas.openxmlformats.org/drawingml/2006/main" xmlns:r="http://schemas.openxmlformats.org/officeDocument/2006/relationships" xmlns:p="http://schemas.openxmlformats.org/presentationml/2006/main">
+  <p:cSld>
+    <p:spTree>
+      <p:nvGrpSpPr>
+        <p:cNvPr id="1" name=""/>
+        <p:cNvGrpSpPr/>
+        <p:nvPr/>
+      </p:nvGrpSpPr>
+      <p:grpSpPr>
+        <a:xfrm>
+          <a:off x="0" y="0"/>
+          <a:ext cx="0" cy="0"/>
+          <a:chOff x="0" y="0"/>
+          <a:chExt cx="0" cy="0"/>
+        </a:xfrm>
+      </p:grpSpPr>
+      <p:sp>
+        <p:nvSpPr>
+          <p:cNvPr id="2" name="Titel 1">
+            <a:extLst>
+              <a:ext uri="{FF2B5EF4-FFF2-40B4-BE49-F238E27FC236}">
+                <a16:creationId xmlns:a16="http://schemas.microsoft.com/office/drawing/2014/main" id="{7985649B-412A-D8A5-CF03-1C5B54B924D4}"/>
+              </a:ext>
+            </a:extLst>
+          </p:cNvPr>
+          <p:cNvSpPr>
+            <a:spLocks noGrp="1"/>
+          </p:cNvSpPr>
+          <p:nvPr>
+            <p:ph type="title"/>
+          </p:nvPr>
+        </p:nvSpPr>
+        <p:spPr/>
+        <p:txBody>
+          <a:bodyPr/>
+          <a:lstStyle/>
+          <a:p>
+            <a:r>
+              <a:rPr lang="de-DE" dirty="0"/>
               <a:t>Next </a:t>
             </a:r>
             <a:r>
@@ -7321,507 +9924,80 @@
             </a:r>
             <a:r>
               <a:rPr lang="de-DE" dirty="0"/>
-              <a:t> end2end </a:t>
+              <a:t> end-</a:t>
+            </a:r>
+            <a:r>
+              <a:rPr lang="de-DE" dirty="0" err="1"/>
+              <a:t>to</a:t>
+            </a:r>
+            <a:r>
+              <a:rPr lang="de-DE" dirty="0"/>
+              <a:t>-end </a:t>
             </a:r>
             <a:r>
               <a:rPr lang="de-DE" dirty="0" err="1"/>
               <a:t>setup</a:t>
             </a:r>
+            <a:r>
+              <a:rPr lang="de-DE" dirty="0"/>
+              <a:t> (</a:t>
+            </a:r>
+            <a:r>
+              <a:rPr lang="de-DE" dirty="0" err="1"/>
+              <a:t>try</a:t>
+            </a:r>
+            <a:r>
+              <a:rPr lang="de-DE" dirty="0"/>
+              <a:t> </a:t>
+            </a:r>
+            <a:r>
+              <a:rPr lang="de-DE" dirty="0" err="1"/>
+              <a:t>to</a:t>
+            </a:r>
+            <a:r>
+              <a:rPr lang="de-DE" dirty="0"/>
+              <a:t> </a:t>
+            </a:r>
+            <a:r>
+              <a:rPr lang="de-DE" dirty="0" err="1"/>
+              <a:t>get</a:t>
+            </a:r>
+            <a:r>
+              <a:rPr lang="de-DE" dirty="0"/>
+              <a:t> a </a:t>
+            </a:r>
+            <a:r>
+              <a:rPr lang="de-DE" dirty="0" err="1"/>
+              <a:t>public</a:t>
+            </a:r>
+            <a:r>
+              <a:rPr lang="de-DE" dirty="0"/>
+              <a:t> </a:t>
+            </a:r>
+            <a:r>
+              <a:rPr lang="de-DE" dirty="0" err="1"/>
+              <a:t>test</a:t>
+            </a:r>
+            <a:r>
+              <a:rPr lang="de-DE" dirty="0"/>
+              <a:t> </a:t>
+            </a:r>
+            <a:r>
+              <a:rPr lang="de-DE" dirty="0" err="1"/>
+              <a:t>server</a:t>
+            </a:r>
+            <a:r>
+              <a:rPr lang="de-DE" dirty="0"/>
+              <a:t>)</a:t>
+            </a:r>
+          </a:p>
+          <a:p>
             <a:endParaRPr lang="de-DE" dirty="0"/>
           </a:p>
           <a:p>
-            <a:endParaRPr lang="de-DE" dirty="0"/>
-          </a:p>
-          <a:p>
-            <a:r>
-              <a:rPr lang="de-DE" dirty="0"/>
-              <a:t> </a:t>
-            </a:r>
-          </a:p>
-        </p:txBody>
-      </p:sp>
-      <p:grpSp>
-        <p:nvGrpSpPr>
-          <p:cNvPr id="12" name="Gruppieren 11">
-            <a:extLst>
-              <a:ext uri="{FF2B5EF4-FFF2-40B4-BE49-F238E27FC236}">
-                <a16:creationId xmlns:a16="http://schemas.microsoft.com/office/drawing/2014/main" id="{41042AA5-BF29-5831-1649-7771AE35147A}"/>
-              </a:ext>
-            </a:extLst>
-          </p:cNvPr>
-          <p:cNvGrpSpPr/>
-          <p:nvPr/>
-        </p:nvGrpSpPr>
-        <p:grpSpPr>
-          <a:xfrm>
-            <a:off x="7927588" y="5365344"/>
-            <a:ext cx="3815576" cy="1003570"/>
-            <a:chOff x="7854174" y="1046105"/>
-            <a:chExt cx="3815576" cy="1003570"/>
-          </a:xfrm>
-        </p:grpSpPr>
-        <p:sp>
-          <p:nvSpPr>
-            <p:cNvPr id="5" name="Textfeld 4">
-              <a:extLst>
-                <a:ext uri="{FF2B5EF4-FFF2-40B4-BE49-F238E27FC236}">
-                  <a16:creationId xmlns:a16="http://schemas.microsoft.com/office/drawing/2014/main" id="{E2A98E6E-D8B7-83F2-4AC2-C6EAC38CDDD4}"/>
-                </a:ext>
-              </a:extLst>
-            </p:cNvPr>
-            <p:cNvSpPr txBox="1"/>
-            <p:nvPr/>
-          </p:nvSpPr>
-          <p:spPr>
-            <a:xfrm>
-              <a:off x="7854174" y="1046105"/>
-              <a:ext cx="817757" cy="260195"/>
-            </a:xfrm>
-            <a:prstGeom prst="rect">
-              <a:avLst/>
-            </a:prstGeom>
-            <a:noFill/>
-          </p:spPr>
-          <p:txBody>
-            <a:bodyPr wrap="square" lIns="0" tIns="0" rIns="0" bIns="0" rtlCol="0">
-              <a:noAutofit/>
-            </a:bodyPr>
-            <a:lstStyle/>
-            <a:p>
-              <a:pPr>
-                <a:lnSpc>
-                  <a:spcPct val="110000"/>
-                </a:lnSpc>
-                <a:spcBef>
-                  <a:spcPts val="0"/>
-                </a:spcBef>
-              </a:pPr>
-              <a:r>
-                <a:rPr lang="de-DE" sz="1400" dirty="0" err="1">
-                  <a:solidFill>
-                    <a:schemeClr val="tx1"/>
-                  </a:solidFill>
-                </a:rPr>
-                <a:t>upstream</a:t>
-              </a:r>
-              <a:endParaRPr lang="de-DE" sz="1400" dirty="0">
-                <a:solidFill>
-                  <a:schemeClr val="tx1"/>
-                </a:solidFill>
-              </a:endParaRPr>
-            </a:p>
-          </p:txBody>
-        </p:sp>
-        <p:sp>
-          <p:nvSpPr>
-            <p:cNvPr id="6" name="Textfeld 5">
-              <a:extLst>
-                <a:ext uri="{FF2B5EF4-FFF2-40B4-BE49-F238E27FC236}">
-                  <a16:creationId xmlns:a16="http://schemas.microsoft.com/office/drawing/2014/main" id="{34506890-66BF-9D71-3D93-1433E72283EE}"/>
-                </a:ext>
-              </a:extLst>
-            </p:cNvPr>
-            <p:cNvSpPr txBox="1"/>
-            <p:nvPr/>
-          </p:nvSpPr>
-          <p:spPr>
-            <a:xfrm>
-              <a:off x="8415452" y="1287715"/>
-              <a:ext cx="1535152" cy="260195"/>
-            </a:xfrm>
-            <a:prstGeom prst="rect">
-              <a:avLst/>
-            </a:prstGeom>
-            <a:noFill/>
-          </p:spPr>
-          <p:txBody>
-            <a:bodyPr wrap="square" lIns="0" tIns="0" rIns="0" bIns="0" rtlCol="0">
-              <a:noAutofit/>
-            </a:bodyPr>
-            <a:lstStyle/>
-            <a:p>
-              <a:pPr>
-                <a:lnSpc>
-                  <a:spcPct val="110000"/>
-                </a:lnSpc>
-                <a:spcBef>
-                  <a:spcPts val="0"/>
-                </a:spcBef>
-              </a:pPr>
-              <a:r>
-                <a:rPr lang="de-DE" sz="1400" dirty="0" err="1">
-                  <a:solidFill>
-                    <a:schemeClr val="tx1"/>
-                  </a:solidFill>
-                </a:rPr>
-                <a:t>dummy</a:t>
-              </a:r>
-              <a:r>
-                <a:rPr lang="de-DE" sz="1400" dirty="0">
-                  <a:solidFill>
-                    <a:schemeClr val="tx1"/>
-                  </a:solidFill>
-                </a:rPr>
-                <a:t> </a:t>
-              </a:r>
-              <a:r>
-                <a:rPr lang="de-DE" sz="1400" dirty="0" err="1">
-                  <a:solidFill>
-                    <a:schemeClr val="tx1"/>
-                  </a:solidFill>
-                </a:rPr>
-                <a:t>collection</a:t>
-              </a:r>
-              <a:endParaRPr lang="de-DE" sz="1400" dirty="0">
-                <a:solidFill>
-                  <a:schemeClr val="tx1"/>
-                </a:solidFill>
-              </a:endParaRPr>
-            </a:p>
-          </p:txBody>
-        </p:sp>
-        <p:sp>
-          <p:nvSpPr>
-            <p:cNvPr id="7" name="Textfeld 6">
-              <a:extLst>
-                <a:ext uri="{FF2B5EF4-FFF2-40B4-BE49-F238E27FC236}">
-                  <a16:creationId xmlns:a16="http://schemas.microsoft.com/office/drawing/2014/main" id="{CAF1F380-10B5-04E0-5F88-53B3EA8BA53F}"/>
-                </a:ext>
-              </a:extLst>
-            </p:cNvPr>
-            <p:cNvSpPr txBox="1"/>
-            <p:nvPr/>
-          </p:nvSpPr>
-          <p:spPr>
-            <a:xfrm>
-              <a:off x="9727579" y="1536778"/>
-              <a:ext cx="1393903" cy="260195"/>
-            </a:xfrm>
-            <a:prstGeom prst="rect">
-              <a:avLst/>
-            </a:prstGeom>
-            <a:noFill/>
-          </p:spPr>
-          <p:txBody>
-            <a:bodyPr wrap="square" lIns="0" tIns="0" rIns="0" bIns="0" rtlCol="0">
-              <a:noAutofit/>
-            </a:bodyPr>
-            <a:lstStyle/>
-            <a:p>
-              <a:pPr>
-                <a:lnSpc>
-                  <a:spcPct val="110000"/>
-                </a:lnSpc>
-                <a:spcBef>
-                  <a:spcPts val="0"/>
-                </a:spcBef>
-              </a:pPr>
-              <a:r>
-                <a:rPr lang="de-DE" sz="1400" dirty="0">
-                  <a:solidFill>
-                    <a:schemeClr val="tx1"/>
-                  </a:solidFill>
-                </a:rPr>
-                <a:t>tool-project</a:t>
-              </a:r>
-            </a:p>
-          </p:txBody>
-        </p:sp>
-        <p:sp>
-          <p:nvSpPr>
-            <p:cNvPr id="8" name="Pfeil: gebogen 7">
-              <a:extLst>
-                <a:ext uri="{FF2B5EF4-FFF2-40B4-BE49-F238E27FC236}">
-                  <a16:creationId xmlns:a16="http://schemas.microsoft.com/office/drawing/2014/main" id="{2AF72C5B-637E-B7D9-893D-9F5B45D5E05E}"/>
-                </a:ext>
-              </a:extLst>
-            </p:cNvPr>
-            <p:cNvSpPr/>
-            <p:nvPr/>
-          </p:nvSpPr>
-          <p:spPr bwMode="auto">
-            <a:xfrm rot="5400000">
-              <a:off x="8683084" y="1076558"/>
-              <a:ext cx="275063" cy="297366"/>
-            </a:xfrm>
-            <a:prstGeom prst="bentArrow">
-              <a:avLst/>
-            </a:prstGeom>
-            <a:solidFill>
-              <a:srgbClr val="EB780A"/>
-            </a:solidFill>
-            <a:ln>
-              <a:noFill/>
-            </a:ln>
-            <a:effectLst/>
-          </p:spPr>
-          <p:txBody>
-            <a:bodyPr wrap="square" lIns="108000" tIns="54000" rIns="108000" bIns="54000" numCol="1" spcCol="72000" rtlCol="0" anchor="ctr">
-              <a:noAutofit/>
-            </a:bodyPr>
-            <a:lstStyle/>
-            <a:p>
-              <a:pPr algn="ctr">
-                <a:lnSpc>
-                  <a:spcPct val="110000"/>
-                </a:lnSpc>
-                <a:spcBef>
-                  <a:spcPct val="0"/>
-                </a:spcBef>
-                <a:buFont typeface="Wingdings" charset="0"/>
-                <a:buNone/>
-              </a:pPr>
-              <a:endParaRPr lang="de-DE" sz="1800" b="1" dirty="0" err="1">
-                <a:solidFill>
-                  <a:schemeClr val="tx1"/>
-                </a:solidFill>
-              </a:endParaRPr>
-            </a:p>
-          </p:txBody>
-        </p:sp>
-        <p:sp>
-          <p:nvSpPr>
-            <p:cNvPr id="9" name="Pfeil: gebogen 8">
-              <a:extLst>
-                <a:ext uri="{FF2B5EF4-FFF2-40B4-BE49-F238E27FC236}">
-                  <a16:creationId xmlns:a16="http://schemas.microsoft.com/office/drawing/2014/main" id="{15CEFC45-67D5-14DB-C4AB-F1A52561FEEC}"/>
-                </a:ext>
-              </a:extLst>
-            </p:cNvPr>
-            <p:cNvSpPr/>
-            <p:nvPr/>
-          </p:nvSpPr>
-          <p:spPr bwMode="auto">
-            <a:xfrm rot="5400000">
-              <a:off x="9846528" y="1330422"/>
-              <a:ext cx="275063" cy="297366"/>
-            </a:xfrm>
-            <a:prstGeom prst="bentArrow">
-              <a:avLst/>
-            </a:prstGeom>
-            <a:solidFill>
-              <a:srgbClr val="EB780A"/>
-            </a:solidFill>
-            <a:ln>
-              <a:noFill/>
-            </a:ln>
-            <a:effectLst/>
-          </p:spPr>
-          <p:txBody>
-            <a:bodyPr wrap="square" lIns="108000" tIns="54000" rIns="108000" bIns="54000" numCol="1" spcCol="72000" rtlCol="0" anchor="ctr">
-              <a:noAutofit/>
-            </a:bodyPr>
-            <a:lstStyle/>
-            <a:p>
-              <a:pPr algn="ctr">
-                <a:lnSpc>
-                  <a:spcPct val="110000"/>
-                </a:lnSpc>
-                <a:spcBef>
-                  <a:spcPct val="0"/>
-                </a:spcBef>
-                <a:buFont typeface="Wingdings" charset="0"/>
-                <a:buNone/>
-              </a:pPr>
-              <a:endParaRPr lang="de-DE" sz="1800" b="1" dirty="0" err="1">
-                <a:solidFill>
-                  <a:schemeClr val="tx1"/>
-                </a:solidFill>
-              </a:endParaRPr>
-            </a:p>
-          </p:txBody>
-        </p:sp>
-        <p:sp>
-          <p:nvSpPr>
-            <p:cNvPr id="10" name="Textfeld 9">
-              <a:extLst>
-                <a:ext uri="{FF2B5EF4-FFF2-40B4-BE49-F238E27FC236}">
-                  <a16:creationId xmlns:a16="http://schemas.microsoft.com/office/drawing/2014/main" id="{94167458-C5F9-F8C7-E093-9F70E3F9AF14}"/>
-                </a:ext>
-              </a:extLst>
-            </p:cNvPr>
-            <p:cNvSpPr txBox="1"/>
-            <p:nvPr/>
-          </p:nvSpPr>
-          <p:spPr>
-            <a:xfrm>
-              <a:off x="10275847" y="1789480"/>
-              <a:ext cx="1393903" cy="260195"/>
-            </a:xfrm>
-            <a:prstGeom prst="rect">
-              <a:avLst/>
-            </a:prstGeom>
-            <a:noFill/>
-          </p:spPr>
-          <p:txBody>
-            <a:bodyPr wrap="square" lIns="0" tIns="0" rIns="0" bIns="0" rtlCol="0">
-              <a:noAutofit/>
-            </a:bodyPr>
-            <a:lstStyle/>
-            <a:p>
-              <a:pPr>
-                <a:lnSpc>
-                  <a:spcPct val="110000"/>
-                </a:lnSpc>
-                <a:spcBef>
-                  <a:spcPts val="0"/>
-                </a:spcBef>
-              </a:pPr>
-              <a:r>
-                <a:rPr lang="de-DE" sz="1400" dirty="0" err="1">
-                  <a:solidFill>
-                    <a:schemeClr val="tx1"/>
-                  </a:solidFill>
-                </a:rPr>
-                <a:t>installation</a:t>
-              </a:r>
-              <a:r>
-                <a:rPr lang="de-DE" sz="1400" dirty="0">
-                  <a:solidFill>
-                    <a:schemeClr val="tx1"/>
-                  </a:solidFill>
-                </a:rPr>
-                <a:t> check</a:t>
-              </a:r>
-            </a:p>
-          </p:txBody>
-        </p:sp>
-        <p:sp>
-          <p:nvSpPr>
-            <p:cNvPr id="11" name="Pfeil: gebogen 10">
-              <a:extLst>
-                <a:ext uri="{FF2B5EF4-FFF2-40B4-BE49-F238E27FC236}">
-                  <a16:creationId xmlns:a16="http://schemas.microsoft.com/office/drawing/2014/main" id="{7F813128-E0E2-6048-B0A4-9FE9876D96E9}"/>
-                </a:ext>
-              </a:extLst>
-            </p:cNvPr>
-            <p:cNvSpPr/>
-            <p:nvPr/>
-          </p:nvSpPr>
-          <p:spPr bwMode="auto">
-            <a:xfrm rot="5400000">
-              <a:off x="10631756" y="1545391"/>
-              <a:ext cx="275063" cy="297366"/>
-            </a:xfrm>
-            <a:prstGeom prst="bentArrow">
-              <a:avLst/>
-            </a:prstGeom>
-            <a:solidFill>
-              <a:srgbClr val="EB780A"/>
-            </a:solidFill>
-            <a:ln>
-              <a:noFill/>
-            </a:ln>
-            <a:effectLst/>
-          </p:spPr>
-          <p:txBody>
-            <a:bodyPr wrap="square" lIns="108000" tIns="54000" rIns="108000" bIns="54000" numCol="1" spcCol="72000" rtlCol="0" anchor="ctr">
-              <a:noAutofit/>
-            </a:bodyPr>
-            <a:lstStyle/>
-            <a:p>
-              <a:pPr algn="ctr">
-                <a:lnSpc>
-                  <a:spcPct val="110000"/>
-                </a:lnSpc>
-                <a:spcBef>
-                  <a:spcPct val="0"/>
-                </a:spcBef>
-                <a:buFont typeface="Wingdings" charset="0"/>
-                <a:buNone/>
-              </a:pPr>
-              <a:endParaRPr lang="de-DE" sz="1800" b="1" dirty="0" err="1">
-                <a:solidFill>
-                  <a:schemeClr val="tx1"/>
-                </a:solidFill>
-              </a:endParaRPr>
-            </a:p>
-          </p:txBody>
-        </p:sp>
-      </p:grpSp>
-      <p:sp>
-        <p:nvSpPr>
-          <p:cNvPr id="4" name="Textfeld 3">
-            <a:extLst>
-              <a:ext uri="{FF2B5EF4-FFF2-40B4-BE49-F238E27FC236}">
-                <a16:creationId xmlns:a16="http://schemas.microsoft.com/office/drawing/2014/main" id="{A49E128A-7800-F571-AE92-D761C666CDBC}"/>
-              </a:ext>
-            </a:extLst>
-          </p:cNvPr>
-          <p:cNvSpPr txBox="1"/>
-          <p:nvPr/>
-        </p:nvSpPr>
-        <p:spPr>
-          <a:xfrm>
-            <a:off x="1256371" y="5977054"/>
-            <a:ext cx="4259766" cy="252761"/>
-          </a:xfrm>
-          <a:prstGeom prst="rect">
-            <a:avLst/>
-          </a:prstGeom>
-          <a:noFill/>
-        </p:spPr>
-        <p:txBody>
-          <a:bodyPr wrap="square" lIns="0" tIns="0" rIns="0" bIns="0" rtlCol="0">
-            <a:noAutofit/>
-          </a:bodyPr>
-          <a:lstStyle/>
-          <a:p>
-            <a:pPr>
-              <a:lnSpc>
-                <a:spcPct val="110000"/>
-              </a:lnSpc>
-              <a:spcBef>
-                <a:spcPts val="0"/>
-              </a:spcBef>
-            </a:pPr>
-            <a:r>
-              <a:rPr lang="de-DE" sz="1400" dirty="0" err="1">
-                <a:solidFill>
-                  <a:schemeClr val="tx1"/>
-                </a:solidFill>
-              </a:rPr>
-              <a:t>Maintained</a:t>
-            </a:r>
-            <a:r>
-              <a:rPr lang="de-DE" sz="1400" dirty="0">
-                <a:solidFill>
-                  <a:schemeClr val="tx1"/>
-                </a:solidFill>
-              </a:rPr>
-              <a:t> </a:t>
-            </a:r>
-            <a:r>
-              <a:rPr lang="de-DE" sz="1400" dirty="0" err="1">
-                <a:solidFill>
-                  <a:schemeClr val="tx1"/>
-                </a:solidFill>
-              </a:rPr>
-              <a:t>by</a:t>
-            </a:r>
-            <a:r>
-              <a:rPr lang="de-DE" sz="1400" dirty="0">
-                <a:solidFill>
-                  <a:schemeClr val="tx1"/>
-                </a:solidFill>
-              </a:rPr>
-              <a:t> </a:t>
-            </a:r>
-            <a:r>
-              <a:rPr lang="de-DE" sz="1400" dirty="0" err="1">
-                <a:solidFill>
-                  <a:schemeClr val="tx1"/>
-                </a:solidFill>
-              </a:rPr>
-              <a:t>yourself</a:t>
-            </a:r>
-            <a:r>
-              <a:rPr lang="de-DE" sz="1400" dirty="0">
-                <a:solidFill>
-                  <a:schemeClr val="tx1"/>
-                </a:solidFill>
-              </a:rPr>
-              <a:t>!</a:t>
+            <a:r>
+              <a:rPr lang="de-DE" dirty="0"/>
+              <a:t> </a:t>
             </a:r>
           </a:p>
         </p:txBody>
@@ -7839,7 +10015,7 @@
 </p:sld>
 </file>
 
-<file path=ppt/slides/slide12.xml><?xml version="1.0" encoding="utf-8"?>
+<file path=ppt/slides/slide13.xml><?xml version="1.0" encoding="utf-8"?>
 <p:sld xmlns:a="http://schemas.openxmlformats.org/drawingml/2006/main" xmlns:r="http://schemas.openxmlformats.org/officeDocument/2006/relationships" xmlns:p="http://schemas.openxmlformats.org/presentationml/2006/main">
   <p:cSld>
     <p:spTree>
@@ -7900,7 +10076,7 @@
 </p:sld>
 </file>
 
-<file path=ppt/slides/slide13.xml><?xml version="1.0" encoding="utf-8"?>
+<file path=ppt/slides/slide14.xml><?xml version="1.0" encoding="utf-8"?>
 <p:sld xmlns:a="http://schemas.openxmlformats.org/drawingml/2006/main" xmlns:r="http://schemas.openxmlformats.org/officeDocument/2006/relationships" xmlns:p="http://schemas.openxmlformats.org/presentationml/2006/main">
   <p:cSld>
     <p:spTree>
@@ -8013,7 +10189,7 @@
 </p:sld>
 </file>
 
-<file path=ppt/slides/slide14.xml><?xml version="1.0" encoding="utf-8"?>
+<file path=ppt/slides/slide15.xml><?xml version="1.0" encoding="utf-8"?>
 <p:sld xmlns:a="http://schemas.openxmlformats.org/drawingml/2006/main" xmlns:r="http://schemas.openxmlformats.org/officeDocument/2006/relationships" xmlns:p="http://schemas.openxmlformats.org/presentationml/2006/main">
   <p:cSld>
     <p:spTree>
@@ -8971,7 +11147,7 @@
 </p:sld>
 </file>
 
-<file path=ppt/slides/slide15.xml><?xml version="1.0" encoding="utf-8"?>
+<file path=ppt/slides/slide16.xml><?xml version="1.0" encoding="utf-8"?>
 <p:sld xmlns:a="http://schemas.openxmlformats.org/drawingml/2006/main" xmlns:r="http://schemas.openxmlformats.org/officeDocument/2006/relationships" xmlns:p="http://schemas.openxmlformats.org/presentationml/2006/main">
   <p:cSld>
     <p:spTree>
@@ -9163,7 +11339,7 @@
 </p:sld>
 </file>
 
-<file path=ppt/slides/slide16.xml><?xml version="1.0" encoding="utf-8"?>
+<file path=ppt/slides/slide17.xml><?xml version="1.0" encoding="utf-8"?>
 <p:sld xmlns:a="http://schemas.openxmlformats.org/drawingml/2006/main" xmlns:r="http://schemas.openxmlformats.org/officeDocument/2006/relationships" xmlns:p="http://schemas.openxmlformats.org/presentationml/2006/main">
   <p:cSld>
     <p:spTree>
@@ -9381,7 +11557,7 @@
 </p:sld>
 </file>
 
-<file path=ppt/slides/slide17.xml><?xml version="1.0" encoding="utf-8"?>
+<file path=ppt/slides/slide18.xml><?xml version="1.0" encoding="utf-8"?>
 <p:sld xmlns:a="http://schemas.openxmlformats.org/drawingml/2006/main" xmlns:r="http://schemas.openxmlformats.org/officeDocument/2006/relationships" xmlns:p="http://schemas.openxmlformats.org/presentationml/2006/main">
   <p:cSld>
     <p:spTree>
@@ -9922,7 +12098,7 @@
 </p:sld>
 </file>
 
-<file path=ppt/slides/slide18.xml><?xml version="1.0" encoding="utf-8"?>
+<file path=ppt/slides/slide19.xml><?xml version="1.0" encoding="utf-8"?>
 <p:sld xmlns:a="http://schemas.openxmlformats.org/drawingml/2006/main" xmlns:r="http://schemas.openxmlformats.org/officeDocument/2006/relationships" xmlns:p="http://schemas.openxmlformats.org/presentationml/2006/main">
   <p:cSld>
     <p:spTree>
@@ -10443,218 +12619,6 @@
 </p:sld>
 </file>
 
-<file path=ppt/slides/slide19.xml><?xml version="1.0" encoding="utf-8"?>
-<p:sld xmlns:a="http://schemas.openxmlformats.org/drawingml/2006/main" xmlns:r="http://schemas.openxmlformats.org/officeDocument/2006/relationships" xmlns:p="http://schemas.openxmlformats.org/presentationml/2006/main">
-  <p:cSld>
-    <p:spTree>
-      <p:nvGrpSpPr>
-        <p:cNvPr id="1" name=""/>
-        <p:cNvGrpSpPr/>
-        <p:nvPr/>
-      </p:nvGrpSpPr>
-      <p:grpSpPr>
-        <a:xfrm>
-          <a:off x="0" y="0"/>
-          <a:ext cx="0" cy="0"/>
-          <a:chOff x="0" y="0"/>
-          <a:chExt cx="0" cy="0"/>
-        </a:xfrm>
-      </p:grpSpPr>
-      <p:sp>
-        <p:nvSpPr>
-          <p:cNvPr id="2" name="Titel 1">
-            <a:extLst>
-              <a:ext uri="{FF2B5EF4-FFF2-40B4-BE49-F238E27FC236}">
-                <a16:creationId xmlns:a16="http://schemas.microsoft.com/office/drawing/2014/main" id="{3AD7A717-9CA7-12AD-D154-471A705E0434}"/>
-              </a:ext>
-            </a:extLst>
-          </p:cNvPr>
-          <p:cNvSpPr>
-            <a:spLocks noGrp="1"/>
-          </p:cNvSpPr>
-          <p:nvPr>
-            <p:ph type="title"/>
-          </p:nvPr>
-        </p:nvSpPr>
-        <p:spPr/>
-        <p:txBody>
-          <a:bodyPr/>
-          <a:lstStyle/>
-          <a:p>
-            <a:r>
-              <a:rPr lang="de-DE" dirty="0"/>
-              <a:t>Showcase</a:t>
-            </a:r>
-          </a:p>
-        </p:txBody>
-      </p:sp>
-      <p:sp>
-        <p:nvSpPr>
-          <p:cNvPr id="3" name="Textplatzhalter 2">
-            <a:extLst>
-              <a:ext uri="{FF2B5EF4-FFF2-40B4-BE49-F238E27FC236}">
-                <a16:creationId xmlns:a16="http://schemas.microsoft.com/office/drawing/2014/main" id="{8F56A9DC-04AA-DF02-E150-FB65C9692F31}"/>
-              </a:ext>
-            </a:extLst>
-          </p:cNvPr>
-          <p:cNvSpPr>
-            <a:spLocks noGrp="1"/>
-          </p:cNvSpPr>
-          <p:nvPr>
-            <p:ph type="body" sz="quarter" idx="11"/>
-          </p:nvPr>
-        </p:nvSpPr>
-        <p:spPr>
-          <a:xfrm>
-            <a:off x="627062" y="1412875"/>
-            <a:ext cx="11088687" cy="1092607"/>
-          </a:xfrm>
-        </p:spPr>
-        <p:txBody>
-          <a:bodyPr/>
-          <a:lstStyle/>
-          <a:p>
-            <a:r>
-              <a:rPr lang="de-DE" dirty="0" err="1"/>
-              <a:t>Result</a:t>
-            </a:r>
-            <a:r>
-              <a:rPr lang="de-DE" dirty="0"/>
-              <a:t> </a:t>
-            </a:r>
-            <a:r>
-              <a:rPr lang="de-DE" dirty="0" err="1"/>
-              <a:t>repository</a:t>
-            </a:r>
-            <a:endParaRPr lang="de-DE" dirty="0"/>
-          </a:p>
-          <a:p>
-            <a:r>
-              <a:rPr lang="de-DE" dirty="0"/>
-              <a:t>(</a:t>
-            </a:r>
-            <a:r>
-              <a:rPr lang="de-DE" dirty="0" err="1"/>
-              <a:t>scans</a:t>
-            </a:r>
-            <a:r>
-              <a:rPr lang="de-DE" dirty="0"/>
-              <a:t> </a:t>
-            </a:r>
-            <a:r>
-              <a:rPr lang="de-DE" dirty="0" err="1"/>
-              <a:t>are</a:t>
-            </a:r>
-            <a:r>
-              <a:rPr lang="de-DE" dirty="0"/>
-              <a:t> </a:t>
-            </a:r>
-            <a:r>
-              <a:rPr lang="de-DE" dirty="0" err="1"/>
-              <a:t>schedule</a:t>
-            </a:r>
-            <a:r>
-              <a:rPr lang="de-DE" dirty="0"/>
-              <a:t> </a:t>
-            </a:r>
-            <a:r>
-              <a:rPr lang="de-DE" dirty="0" err="1"/>
-              <a:t>nightly</a:t>
-            </a:r>
-            <a:r>
-              <a:rPr lang="de-DE" dirty="0"/>
-              <a:t>) </a:t>
-            </a:r>
-          </a:p>
-          <a:p>
-            <a:pPr marL="285750" indent="-285750">
-              <a:buFontTx/>
-              <a:buChar char="-"/>
-            </a:pPr>
-            <a:endParaRPr lang="de-DE" dirty="0"/>
-          </a:p>
-          <a:p>
-            <a:pPr marL="285750" indent="-285750">
-              <a:buFontTx/>
-              <a:buChar char="-"/>
-            </a:pPr>
-            <a:endParaRPr lang="de-DE" dirty="0"/>
-          </a:p>
-        </p:txBody>
-      </p:sp>
-      <p:pic>
-        <p:nvPicPr>
-          <p:cNvPr id="5" name="Grafik 4">
-            <a:extLst>
-              <a:ext uri="{FF2B5EF4-FFF2-40B4-BE49-F238E27FC236}">
-                <a16:creationId xmlns:a16="http://schemas.microsoft.com/office/drawing/2014/main" id="{24D66FEC-29D8-65BC-10DF-FA7701C3032A}"/>
-              </a:ext>
-            </a:extLst>
-          </p:cNvPr>
-          <p:cNvPicPr>
-            <a:picLocks noChangeAspect="1"/>
-          </p:cNvPicPr>
-          <p:nvPr/>
-        </p:nvPicPr>
-        <p:blipFill>
-          <a:blip r:embed="rId2"/>
-          <a:stretch>
-            <a:fillRect/>
-          </a:stretch>
-        </p:blipFill>
-        <p:spPr>
-          <a:xfrm>
-            <a:off x="2938324" y="1074750"/>
-            <a:ext cx="7949166" cy="4708499"/>
-          </a:xfrm>
-          <a:prstGeom prst="rect">
-            <a:avLst/>
-          </a:prstGeom>
-        </p:spPr>
-      </p:pic>
-      <p:pic>
-        <p:nvPicPr>
-          <p:cNvPr id="9" name="Grafik 8">
-            <a:extLst>
-              <a:ext uri="{FF2B5EF4-FFF2-40B4-BE49-F238E27FC236}">
-                <a16:creationId xmlns:a16="http://schemas.microsoft.com/office/drawing/2014/main" id="{64013030-BAD4-9746-4FD0-6F12DF88542A}"/>
-              </a:ext>
-            </a:extLst>
-          </p:cNvPr>
-          <p:cNvPicPr>
-            <a:picLocks noChangeAspect="1"/>
-          </p:cNvPicPr>
-          <p:nvPr/>
-        </p:nvPicPr>
-        <p:blipFill>
-          <a:blip r:embed="rId3"/>
-          <a:stretch>
-            <a:fillRect/>
-          </a:stretch>
-        </p:blipFill>
-        <p:spPr>
-          <a:xfrm>
-            <a:off x="328909" y="2180508"/>
-            <a:ext cx="1963463" cy="2449563"/>
-          </a:xfrm>
-          <a:prstGeom prst="rect">
-            <a:avLst/>
-          </a:prstGeom>
-        </p:spPr>
-      </p:pic>
-    </p:spTree>
-    <p:extLst>
-      <p:ext uri="{BB962C8B-B14F-4D97-AF65-F5344CB8AC3E}">
-        <p14:creationId xmlns:p14="http://schemas.microsoft.com/office/powerpoint/2010/main" val="567814551"/>
-      </p:ext>
-    </p:extLst>
-  </p:cSld>
-  <p:clrMapOvr>
-    <a:masterClrMapping/>
-  </p:clrMapOvr>
-</p:sld>
-</file>
-
 <file path=ppt/slides/slide2.xml><?xml version="1.0" encoding="utf-8"?>
 <p:sld xmlns:a="http://schemas.openxmlformats.org/drawingml/2006/main" xmlns:r="http://schemas.openxmlformats.org/officeDocument/2006/relationships" xmlns:p="http://schemas.openxmlformats.org/presentationml/2006/main">
   <p:cSld>
@@ -11502,6 +13466,218 @@
 </file>
 
 <file path=ppt/slides/slide20.xml><?xml version="1.0" encoding="utf-8"?>
+<p:sld xmlns:a="http://schemas.openxmlformats.org/drawingml/2006/main" xmlns:r="http://schemas.openxmlformats.org/officeDocument/2006/relationships" xmlns:p="http://schemas.openxmlformats.org/presentationml/2006/main">
+  <p:cSld>
+    <p:spTree>
+      <p:nvGrpSpPr>
+        <p:cNvPr id="1" name=""/>
+        <p:cNvGrpSpPr/>
+        <p:nvPr/>
+      </p:nvGrpSpPr>
+      <p:grpSpPr>
+        <a:xfrm>
+          <a:off x="0" y="0"/>
+          <a:ext cx="0" cy="0"/>
+          <a:chOff x="0" y="0"/>
+          <a:chExt cx="0" cy="0"/>
+        </a:xfrm>
+      </p:grpSpPr>
+      <p:sp>
+        <p:nvSpPr>
+          <p:cNvPr id="2" name="Titel 1">
+            <a:extLst>
+              <a:ext uri="{FF2B5EF4-FFF2-40B4-BE49-F238E27FC236}">
+                <a16:creationId xmlns:a16="http://schemas.microsoft.com/office/drawing/2014/main" id="{3AD7A717-9CA7-12AD-D154-471A705E0434}"/>
+              </a:ext>
+            </a:extLst>
+          </p:cNvPr>
+          <p:cNvSpPr>
+            <a:spLocks noGrp="1"/>
+          </p:cNvSpPr>
+          <p:nvPr>
+            <p:ph type="title"/>
+          </p:nvPr>
+        </p:nvSpPr>
+        <p:spPr/>
+        <p:txBody>
+          <a:bodyPr/>
+          <a:lstStyle/>
+          <a:p>
+            <a:r>
+              <a:rPr lang="de-DE" dirty="0"/>
+              <a:t>Showcase</a:t>
+            </a:r>
+          </a:p>
+        </p:txBody>
+      </p:sp>
+      <p:sp>
+        <p:nvSpPr>
+          <p:cNvPr id="3" name="Textplatzhalter 2">
+            <a:extLst>
+              <a:ext uri="{FF2B5EF4-FFF2-40B4-BE49-F238E27FC236}">
+                <a16:creationId xmlns:a16="http://schemas.microsoft.com/office/drawing/2014/main" id="{8F56A9DC-04AA-DF02-E150-FB65C9692F31}"/>
+              </a:ext>
+            </a:extLst>
+          </p:cNvPr>
+          <p:cNvSpPr>
+            <a:spLocks noGrp="1"/>
+          </p:cNvSpPr>
+          <p:nvPr>
+            <p:ph type="body" sz="quarter" idx="11"/>
+          </p:nvPr>
+        </p:nvSpPr>
+        <p:spPr>
+          <a:xfrm>
+            <a:off x="627062" y="1412875"/>
+            <a:ext cx="11088687" cy="1092607"/>
+          </a:xfrm>
+        </p:spPr>
+        <p:txBody>
+          <a:bodyPr/>
+          <a:lstStyle/>
+          <a:p>
+            <a:r>
+              <a:rPr lang="de-DE" dirty="0" err="1"/>
+              <a:t>Result</a:t>
+            </a:r>
+            <a:r>
+              <a:rPr lang="de-DE" dirty="0"/>
+              <a:t> </a:t>
+            </a:r>
+            <a:r>
+              <a:rPr lang="de-DE" dirty="0" err="1"/>
+              <a:t>repository</a:t>
+            </a:r>
+            <a:endParaRPr lang="de-DE" dirty="0"/>
+          </a:p>
+          <a:p>
+            <a:r>
+              <a:rPr lang="de-DE" dirty="0"/>
+              <a:t>(</a:t>
+            </a:r>
+            <a:r>
+              <a:rPr lang="de-DE" dirty="0" err="1"/>
+              <a:t>scans</a:t>
+            </a:r>
+            <a:r>
+              <a:rPr lang="de-DE" dirty="0"/>
+              <a:t> </a:t>
+            </a:r>
+            <a:r>
+              <a:rPr lang="de-DE" dirty="0" err="1"/>
+              <a:t>are</a:t>
+            </a:r>
+            <a:r>
+              <a:rPr lang="de-DE" dirty="0"/>
+              <a:t> </a:t>
+            </a:r>
+            <a:r>
+              <a:rPr lang="de-DE" dirty="0" err="1"/>
+              <a:t>schedule</a:t>
+            </a:r>
+            <a:r>
+              <a:rPr lang="de-DE" dirty="0"/>
+              <a:t> </a:t>
+            </a:r>
+            <a:r>
+              <a:rPr lang="de-DE" dirty="0" err="1"/>
+              <a:t>nightly</a:t>
+            </a:r>
+            <a:r>
+              <a:rPr lang="de-DE" dirty="0"/>
+              <a:t>) </a:t>
+            </a:r>
+          </a:p>
+          <a:p>
+            <a:pPr marL="285750" indent="-285750">
+              <a:buFontTx/>
+              <a:buChar char="-"/>
+            </a:pPr>
+            <a:endParaRPr lang="de-DE" dirty="0"/>
+          </a:p>
+          <a:p>
+            <a:pPr marL="285750" indent="-285750">
+              <a:buFontTx/>
+              <a:buChar char="-"/>
+            </a:pPr>
+            <a:endParaRPr lang="de-DE" dirty="0"/>
+          </a:p>
+        </p:txBody>
+      </p:sp>
+      <p:pic>
+        <p:nvPicPr>
+          <p:cNvPr id="5" name="Grafik 4">
+            <a:extLst>
+              <a:ext uri="{FF2B5EF4-FFF2-40B4-BE49-F238E27FC236}">
+                <a16:creationId xmlns:a16="http://schemas.microsoft.com/office/drawing/2014/main" id="{24D66FEC-29D8-65BC-10DF-FA7701C3032A}"/>
+              </a:ext>
+            </a:extLst>
+          </p:cNvPr>
+          <p:cNvPicPr>
+            <a:picLocks noChangeAspect="1"/>
+          </p:cNvPicPr>
+          <p:nvPr/>
+        </p:nvPicPr>
+        <p:blipFill>
+          <a:blip r:embed="rId2"/>
+          <a:stretch>
+            <a:fillRect/>
+          </a:stretch>
+        </p:blipFill>
+        <p:spPr>
+          <a:xfrm>
+            <a:off x="2938324" y="1074750"/>
+            <a:ext cx="7949166" cy="4708499"/>
+          </a:xfrm>
+          <a:prstGeom prst="rect">
+            <a:avLst/>
+          </a:prstGeom>
+        </p:spPr>
+      </p:pic>
+      <p:pic>
+        <p:nvPicPr>
+          <p:cNvPr id="9" name="Grafik 8">
+            <a:extLst>
+              <a:ext uri="{FF2B5EF4-FFF2-40B4-BE49-F238E27FC236}">
+                <a16:creationId xmlns:a16="http://schemas.microsoft.com/office/drawing/2014/main" id="{64013030-BAD4-9746-4FD0-6F12DF88542A}"/>
+              </a:ext>
+            </a:extLst>
+          </p:cNvPr>
+          <p:cNvPicPr>
+            <a:picLocks noChangeAspect="1"/>
+          </p:cNvPicPr>
+          <p:nvPr/>
+        </p:nvPicPr>
+        <p:blipFill>
+          <a:blip r:embed="rId3"/>
+          <a:stretch>
+            <a:fillRect/>
+          </a:stretch>
+        </p:blipFill>
+        <p:spPr>
+          <a:xfrm>
+            <a:off x="328909" y="2180508"/>
+            <a:ext cx="1963463" cy="2449563"/>
+          </a:xfrm>
+          <a:prstGeom prst="rect">
+            <a:avLst/>
+          </a:prstGeom>
+        </p:spPr>
+      </p:pic>
+    </p:spTree>
+    <p:extLst>
+      <p:ext uri="{BB962C8B-B14F-4D97-AF65-F5344CB8AC3E}">
+        <p14:creationId xmlns:p14="http://schemas.microsoft.com/office/powerpoint/2010/main" val="567814551"/>
+      </p:ext>
+    </p:extLst>
+  </p:cSld>
+  <p:clrMapOvr>
+    <a:masterClrMapping/>
+  </p:clrMapOvr>
+</p:sld>
+</file>
+
+<file path=ppt/slides/slide21.xml><?xml version="1.0" encoding="utf-8"?>
 <p:sld xmlns:a="http://schemas.openxmlformats.org/drawingml/2006/main" xmlns:r="http://schemas.openxmlformats.org/officeDocument/2006/relationships" xmlns:p="http://schemas.openxmlformats.org/presentationml/2006/main">
   <p:cSld>
     <p:spTree>
@@ -11829,7 +14005,7 @@
 </p:sld>
 </file>
 
-<file path=ppt/slides/slide21.xml><?xml version="1.0" encoding="utf-8"?>
+<file path=ppt/slides/slide22.xml><?xml version="1.0" encoding="utf-8"?>
 <p:sld xmlns:a="http://schemas.openxmlformats.org/drawingml/2006/main" xmlns:r="http://schemas.openxmlformats.org/officeDocument/2006/relationships" xmlns:p="http://schemas.openxmlformats.org/presentationml/2006/main">
   <p:cSld>
     <p:spTree>
@@ -22029,33 +24205,34 @@
 
 <file path=customXml/item1.xml><?xml version="1.0" encoding="utf-8"?>
 <p4ppTags>
-  <Name>One object (large) + Navigation</Name>
-  <PpLayout>32</PpLayout>
-  <Index>17</Index>
+  <Name>Four objects</Name>
+  <PpLayout>24</PpLayout>
+  <Index>15</Index>
 </p4ppTags>
 </file>
 
 <file path=customXml/item10.xml><?xml version="1.0" encoding="utf-8"?>
-<p4ppTags>
-  <Name>Free Content + Navigation</Name>
-  <PpLayout>32</PpLayout>
-  <Index>16</Index>
-</p4ppTags>
+<p:properties xmlns:p="http://schemas.microsoft.com/office/2006/metadata/properties" xmlns:xsi="http://www.w3.org/2001/XMLSchema-instance">
+  <documentManagement>
+    <PublishingExpirationDate xmlns="http://schemas.microsoft.com/sharepoint/v3" xsi:nil="true"/>
+    <PublishingStartDate xmlns="http://schemas.microsoft.com/sharepoint/v3" xsi:nil="true"/>
+  </documentManagement>
+</p:properties>
 </file>
 
 <file path=customXml/item11.xml><?xml version="1.0" encoding="utf-8"?>
 <p4ppTags>
-  <Name>One object (small)</Name>
-  <PpLayout>16</PpLayout>
-  <Index>11</Index>
+  <Name>Two rows + Navigation</Name>
+  <PpLayout>32</PpLayout>
+  <Index>21</Index>
 </p4ppTags>
 </file>
 
 <file path=customXml/item12.xml><?xml version="1.0" encoding="utf-8"?>
 <p4ppTags>
-  <Name>Two rows + Navigation</Name>
-  <PpLayout>32</PpLayout>
-  <Index>21</Index>
+  <Name>Two columns</Name>
+  <PpLayout>29</PpLayout>
+  <Index>12</Index>
 </p4ppTags>
 </file>
 
@@ -22068,6 +24245,91 @@
 </file>
 
 <file path=customXml/item14.xml><?xml version="1.0" encoding="utf-8"?>
+<p4ppTags/>
+</file>
+
+<file path=customXml/item15.xml><?xml version="1.0" encoding="utf-8"?>
+<p4ppTags>
+  <Name>One object (small) + Navigation</Name>
+  <PpLayout>32</PpLayout>
+  <Index>18</Index>
+</p4ppTags>
+</file>
+
+<file path=customXml/item16.xml><?xml version="1.0" encoding="utf-8"?>
+<p4ppTags>
+  <Name>Text + Index</Name>
+  <PpLayout>32</PpLayout>
+  <Index>8</Index>
+</p4ppTags>
+</file>
+
+<file path=customXml/item17.xml><?xml version="1.0" encoding="utf-8"?>
+<p4ppTags>
+  <Name>Two columns + Navigation</Name>
+  <PpLayout>32</PpLayout>
+  <Index>19</Index>
+</p4ppTags>
+</file>
+
+<file path=customXml/item18.xml><?xml version="1.0" encoding="utf-8"?>
+<p4ppTags>
+  <Name>One object (large) + Navigation</Name>
+  <PpLayout>32</PpLayout>
+  <Index>17</Index>
+</p4ppTags>
+</file>
+
+<file path=customXml/item2.xml><?xml version="1.0" encoding="utf-8"?>
+<p4ppTags>
+  <Name>One object (small)</Name>
+  <PpLayout>16</PpLayout>
+  <Index>11</Index>
+</p4ppTags>
+</file>
+
+<file path=customXml/item3.xml><?xml version="1.0" encoding="utf-8"?>
+<p4ppTags>
+  <Name>Three columns + Navigation</Name>
+  <PpLayout>32</PpLayout>
+  <Index>20</Index>
+</p4ppTags>
+</file>
+
+<file path=customXml/item4.xml><?xml version="1.0" encoding="utf-8"?>
+<p4ppTags>
+  <Name>Two rows</Name>
+  <PpLayout>32</PpLayout>
+  <Index>13</Index>
+</p4ppTags>
+</file>
+
+<file path=customXml/item5.xml><?xml version="1.0" encoding="utf-8"?>
+<p4ppTags>
+  <Name>Free Content + Navigation</Name>
+  <PpLayout>32</PpLayout>
+  <Index>16</Index>
+</p4ppTags>
+</file>
+
+<file path=customXml/item6.xml><?xml version="1.0" encoding="utf-8"?>
+<p4ppTags>
+  <Name>Three columns</Name>
+  <PpLayout>32</PpLayout>
+  <Index>14</Index>
+</p4ppTags>
+</file>
+
+<file path=customXml/item7.xml><?xml version="1.0" encoding="utf-8"?>
+<?mso-contentType ?>
+<FormTemplates xmlns="http://schemas.microsoft.com/sharepoint/v3/contenttype/forms">
+  <Display>DocumentLibraryForm</Display>
+  <Edit>DocumentLibraryForm</Edit>
+  <New>DocumentLibraryForm</New>
+</FormTemplates>
+</file>
+
+<file path=customXml/item8.xml><?xml version="1.0" encoding="utf-8"?>
 <ct:contentTypeSchema xmlns:ct="http://schemas.microsoft.com/office/2006/metadata/contentType" xmlns:ma="http://schemas.microsoft.com/office/2006/metadata/properties/metaAttributes" ct:_="" ma:_="" ma:contentTypeName="Document" ma:contentTypeID="0x01010026F530587E03684C96E4C14F39C83C8E" ma:contentTypeVersion="1" ma:contentTypeDescription="Create a new document." ma:contentTypeScope="" ma:versionID="a7726241122b1ad33829eba8e69a544b">
   <xsd:schema xmlns:xsd="http://www.w3.org/2001/XMLSchema" xmlns:p="http://schemas.microsoft.com/office/2006/metadata/properties" xmlns:ns1="http://schemas.microsoft.com/sharepoint/v3" targetNamespace="http://schemas.microsoft.com/office/2006/metadata/properties" ma:root="true" ma:fieldsID="ddb0c952b897a810c8a4e377cff6bff8" ns1:_="">
     <xsd:import namespace="http://schemas.microsoft.com/sharepoint/v3"/>
@@ -22133,84 +24395,7 @@
 </ct:contentTypeSchema>
 </file>
 
-<file path=customXml/item15.xml><?xml version="1.0" encoding="utf-8"?>
-<p4ppTags>
-  <Name>Two rows</Name>
-  <PpLayout>32</PpLayout>
-  <Index>13</Index>
-</p4ppTags>
-</file>
-
-<file path=customXml/item16.xml><?xml version="1.0" encoding="utf-8"?>
-<p4ppTags>
-  <Name>Two columns + Navigation</Name>
-  <PpLayout>32</PpLayout>
-  <Index>19</Index>
-</p4ppTags>
-</file>
-
-<file path=customXml/item17.xml><?xml version="1.0" encoding="utf-8"?>
-<p4ppTags>
-  <Name>Two columns</Name>
-  <PpLayout>29</PpLayout>
-  <Index>12</Index>
-</p4ppTags>
-</file>
-
-<file path=customXml/item18.xml><?xml version="1.0" encoding="utf-8"?>
-<p4ppTags/>
-</file>
-
-<file path=customXml/item2.xml><?xml version="1.0" encoding="utf-8"?>
-<p4ppTags>
-  <Name>Text + Index</Name>
-  <PpLayout>32</PpLayout>
-  <Index>8</Index>
-</p4ppTags>
-</file>
-
-<file path=customXml/item3.xml><?xml version="1.0" encoding="utf-8"?>
-<p:properties xmlns:p="http://schemas.microsoft.com/office/2006/metadata/properties" xmlns:xsi="http://www.w3.org/2001/XMLSchema-instance">
-  <documentManagement>
-    <PublishingExpirationDate xmlns="http://schemas.microsoft.com/sharepoint/v3" xsi:nil="true"/>
-    <PublishingStartDate xmlns="http://schemas.microsoft.com/sharepoint/v3" xsi:nil="true"/>
-  </documentManagement>
-</p:properties>
-</file>
-
-<file path=customXml/item4.xml><?xml version="1.0" encoding="utf-8"?>
-<p4ppTags>
-  <Name>Three columns</Name>
-  <PpLayout>32</PpLayout>
-  <Index>14</Index>
-</p4ppTags>
-</file>
-
-<file path=customXml/item5.xml><?xml version="1.0" encoding="utf-8"?>
-<p4ppTags>
-  <Name>Three columns + Navigation</Name>
-  <PpLayout>32</PpLayout>
-  <Index>20</Index>
-</p4ppTags>
-</file>
-
-<file path=customXml/item6.xml><?xml version="1.0" encoding="utf-8"?>
-<p4ppTags>
-  <Name>Four objects</Name>
-  <PpLayout>24</PpLayout>
-  <Index>15</Index>
-</p4ppTags>
-</file>
-
-<file path=customXml/item7.xml><?xml version="1.0" encoding="utf-8"?>
-<p4ppTags>
-  <Name>One object (small) + Navigation</Name>
-  <PpLayout>32</PpLayout>
-  <Index>18</Index>
-</p4ppTags>
-</file>
-
-<file path=customXml/item8.xml><?xml version="1.0" encoding="utf-8"?>
+<file path=customXml/item9.xml><?xml version="1.0" encoding="utf-8"?>
 <p4ppTags>
   <Name>Free Content</Name>
   <PpLayout>11</PpLayout>
@@ -22218,35 +24403,35 @@
 </p4ppTags>
 </file>
 
-<file path=customXml/item9.xml><?xml version="1.0" encoding="utf-8"?>
-<?mso-contentType ?>
-<FormTemplates xmlns="http://schemas.microsoft.com/sharepoint/v3/contenttype/forms">
-  <Display>DocumentLibraryForm</Display>
-  <Edit>DocumentLibraryForm</Edit>
-  <New>DocumentLibraryForm</New>
-</FormTemplates>
-</file>
-
 <file path=customXml/itemProps1.xml><?xml version="1.0" encoding="utf-8"?>
-<ds:datastoreItem xmlns:ds="http://schemas.openxmlformats.org/officeDocument/2006/customXml" ds:itemID="{B27F640E-84DF-4F97-BC70-D045F1E6594F}">
+<ds:datastoreItem xmlns:ds="http://schemas.openxmlformats.org/officeDocument/2006/customXml" ds:itemID="{1581BFFB-B4CE-47A8-BE77-DC1339B1E5A7}">
   <ds:schemaRefs/>
 </ds:datastoreItem>
 </file>
 
 <file path=customXml/itemProps10.xml><?xml version="1.0" encoding="utf-8"?>
-<ds:datastoreItem xmlns:ds="http://schemas.openxmlformats.org/officeDocument/2006/customXml" ds:itemID="{7CC5F709-E74B-4E5F-A728-923D5062EBEF}">
-  <ds:schemaRefs/>
+<ds:datastoreItem xmlns:ds="http://schemas.openxmlformats.org/officeDocument/2006/customXml" ds:itemID="{C3CCD83D-9C91-4A4B-87D6-2A0CC03F9D68}">
+  <ds:schemaRefs>
+    <ds:schemaRef ds:uri="http://purl.org/dc/terms/"/>
+    <ds:schemaRef ds:uri="http://schemas.openxmlformats.org/package/2006/metadata/core-properties"/>
+    <ds:schemaRef ds:uri="http://purl.org/dc/dcmitype/"/>
+    <ds:schemaRef ds:uri="http://schemas.microsoft.com/office/2006/documentManagement/types"/>
+    <ds:schemaRef ds:uri="http://purl.org/dc/elements/1.1/"/>
+    <ds:schemaRef ds:uri="http://schemas.microsoft.com/office/2006/metadata/properties"/>
+    <ds:schemaRef ds:uri="http://schemas.microsoft.com/sharepoint/v3"/>
+    <ds:schemaRef ds:uri="http://www.w3.org/XML/1998/namespace"/>
+  </ds:schemaRefs>
 </ds:datastoreItem>
 </file>
 
 <file path=customXml/itemProps11.xml><?xml version="1.0" encoding="utf-8"?>
-<ds:datastoreItem xmlns:ds="http://schemas.openxmlformats.org/officeDocument/2006/customXml" ds:itemID="{1618AA06-B22E-4D19-9680-0D7830426729}">
+<ds:datastoreItem xmlns:ds="http://schemas.openxmlformats.org/officeDocument/2006/customXml" ds:itemID="{6C79E4F8-DCFB-483C-880A-AEEC6AAFC838}">
   <ds:schemaRefs/>
 </ds:datastoreItem>
 </file>
 
 <file path=customXml/itemProps12.xml><?xml version="1.0" encoding="utf-8"?>
-<ds:datastoreItem xmlns:ds="http://schemas.openxmlformats.org/officeDocument/2006/customXml" ds:itemID="{6C79E4F8-DCFB-483C-880A-AEEC6AAFC838}">
+<ds:datastoreItem xmlns:ds="http://schemas.openxmlformats.org/officeDocument/2006/customXml" ds:itemID="{1666F4C2-68F5-4840-A44A-1A646C0925A1}">
   <ds:schemaRefs/>
 </ds:datastoreItem>
 </file>
@@ -22258,6 +24443,74 @@
 </file>
 
 <file path=customXml/itemProps14.xml><?xml version="1.0" encoding="utf-8"?>
+<ds:datastoreItem xmlns:ds="http://schemas.openxmlformats.org/officeDocument/2006/customXml" ds:itemID="{572FBA73-6DBF-45DA-8282-9342320CFAB0}">
+  <ds:schemaRefs/>
+</ds:datastoreItem>
+</file>
+
+<file path=customXml/itemProps15.xml><?xml version="1.0" encoding="utf-8"?>
+<ds:datastoreItem xmlns:ds="http://schemas.openxmlformats.org/officeDocument/2006/customXml" ds:itemID="{D9FE249F-833E-4CF0-BECB-552D01D7DC9E}">
+  <ds:schemaRefs/>
+</ds:datastoreItem>
+</file>
+
+<file path=customXml/itemProps16.xml><?xml version="1.0" encoding="utf-8"?>
+<ds:datastoreItem xmlns:ds="http://schemas.openxmlformats.org/officeDocument/2006/customXml" ds:itemID="{7E35FEDB-1F0E-4D67-A313-4AC59C26FF29}">
+  <ds:schemaRefs/>
+</ds:datastoreItem>
+</file>
+
+<file path=customXml/itemProps17.xml><?xml version="1.0" encoding="utf-8"?>
+<ds:datastoreItem xmlns:ds="http://schemas.openxmlformats.org/officeDocument/2006/customXml" ds:itemID="{D7BABA95-BFFE-422B-8591-3271669EEA88}">
+  <ds:schemaRefs/>
+</ds:datastoreItem>
+</file>
+
+<file path=customXml/itemProps18.xml><?xml version="1.0" encoding="utf-8"?>
+<ds:datastoreItem xmlns:ds="http://schemas.openxmlformats.org/officeDocument/2006/customXml" ds:itemID="{B27F640E-84DF-4F97-BC70-D045F1E6594F}">
+  <ds:schemaRefs/>
+</ds:datastoreItem>
+</file>
+
+<file path=customXml/itemProps2.xml><?xml version="1.0" encoding="utf-8"?>
+<ds:datastoreItem xmlns:ds="http://schemas.openxmlformats.org/officeDocument/2006/customXml" ds:itemID="{1618AA06-B22E-4D19-9680-0D7830426729}">
+  <ds:schemaRefs/>
+</ds:datastoreItem>
+</file>
+
+<file path=customXml/itemProps3.xml><?xml version="1.0" encoding="utf-8"?>
+<ds:datastoreItem xmlns:ds="http://schemas.openxmlformats.org/officeDocument/2006/customXml" ds:itemID="{85D77EE6-52B7-48BE-9EDB-748F1EBB53DE}">
+  <ds:schemaRefs/>
+</ds:datastoreItem>
+</file>
+
+<file path=customXml/itemProps4.xml><?xml version="1.0" encoding="utf-8"?>
+<ds:datastoreItem xmlns:ds="http://schemas.openxmlformats.org/officeDocument/2006/customXml" ds:itemID="{38AB8DE4-FD9B-4166-BEC3-3F1753596133}">
+  <ds:schemaRefs/>
+</ds:datastoreItem>
+</file>
+
+<file path=customXml/itemProps5.xml><?xml version="1.0" encoding="utf-8"?>
+<ds:datastoreItem xmlns:ds="http://schemas.openxmlformats.org/officeDocument/2006/customXml" ds:itemID="{7CC5F709-E74B-4E5F-A728-923D5062EBEF}">
+  <ds:schemaRefs/>
+</ds:datastoreItem>
+</file>
+
+<file path=customXml/itemProps6.xml><?xml version="1.0" encoding="utf-8"?>
+<ds:datastoreItem xmlns:ds="http://schemas.openxmlformats.org/officeDocument/2006/customXml" ds:itemID="{15CF3461-70D1-4B54-AFAB-DAFDA0A238CD}">
+  <ds:schemaRefs/>
+</ds:datastoreItem>
+</file>
+
+<file path=customXml/itemProps7.xml><?xml version="1.0" encoding="utf-8"?>
+<ds:datastoreItem xmlns:ds="http://schemas.openxmlformats.org/officeDocument/2006/customXml" ds:itemID="{C770A9D8-EB8A-4EA7-9CCD-8AD3EAF96C52}">
+  <ds:schemaRefs>
+    <ds:schemaRef ds:uri="http://schemas.microsoft.com/sharepoint/v3/contenttype/forms"/>
+  </ds:schemaRefs>
+</ds:datastoreItem>
+</file>
+
+<file path=customXml/itemProps8.xml><?xml version="1.0" encoding="utf-8"?>
 <ds:datastoreItem xmlns:ds="http://schemas.openxmlformats.org/officeDocument/2006/customXml" ds:itemID="{DDD5559B-0584-4B05-A285-1FEC88814B30}">
   <ds:schemaRefs>
     <ds:schemaRef ds:uri="http://schemas.microsoft.com/office/2006/metadata/contentType"/>
@@ -22274,85 +24527,8 @@
 </ds:datastoreItem>
 </file>
 
-<file path=customXml/itemProps15.xml><?xml version="1.0" encoding="utf-8"?>
-<ds:datastoreItem xmlns:ds="http://schemas.openxmlformats.org/officeDocument/2006/customXml" ds:itemID="{38AB8DE4-FD9B-4166-BEC3-3F1753596133}">
-  <ds:schemaRefs/>
-</ds:datastoreItem>
-</file>
-
-<file path=customXml/itemProps16.xml><?xml version="1.0" encoding="utf-8"?>
-<ds:datastoreItem xmlns:ds="http://schemas.openxmlformats.org/officeDocument/2006/customXml" ds:itemID="{D7BABA95-BFFE-422B-8591-3271669EEA88}">
-  <ds:schemaRefs/>
-</ds:datastoreItem>
-</file>
-
-<file path=customXml/itemProps17.xml><?xml version="1.0" encoding="utf-8"?>
-<ds:datastoreItem xmlns:ds="http://schemas.openxmlformats.org/officeDocument/2006/customXml" ds:itemID="{1666F4C2-68F5-4840-A44A-1A646C0925A1}">
-  <ds:schemaRefs/>
-</ds:datastoreItem>
-</file>
-
-<file path=customXml/itemProps18.xml><?xml version="1.0" encoding="utf-8"?>
-<ds:datastoreItem xmlns:ds="http://schemas.openxmlformats.org/officeDocument/2006/customXml" ds:itemID="{572FBA73-6DBF-45DA-8282-9342320CFAB0}">
-  <ds:schemaRefs/>
-</ds:datastoreItem>
-</file>
-
-<file path=customXml/itemProps2.xml><?xml version="1.0" encoding="utf-8"?>
-<ds:datastoreItem xmlns:ds="http://schemas.openxmlformats.org/officeDocument/2006/customXml" ds:itemID="{7E35FEDB-1F0E-4D67-A313-4AC59C26FF29}">
-  <ds:schemaRefs/>
-</ds:datastoreItem>
-</file>
-
-<file path=customXml/itemProps3.xml><?xml version="1.0" encoding="utf-8"?>
-<ds:datastoreItem xmlns:ds="http://schemas.openxmlformats.org/officeDocument/2006/customXml" ds:itemID="{C3CCD83D-9C91-4A4B-87D6-2A0CC03F9D68}">
-  <ds:schemaRefs>
-    <ds:schemaRef ds:uri="http://purl.org/dc/terms/"/>
-    <ds:schemaRef ds:uri="http://schemas.openxmlformats.org/package/2006/metadata/core-properties"/>
-    <ds:schemaRef ds:uri="http://purl.org/dc/dcmitype/"/>
-    <ds:schemaRef ds:uri="http://schemas.microsoft.com/office/2006/documentManagement/types"/>
-    <ds:schemaRef ds:uri="http://purl.org/dc/elements/1.1/"/>
-    <ds:schemaRef ds:uri="http://schemas.microsoft.com/office/2006/metadata/properties"/>
-    <ds:schemaRef ds:uri="http://schemas.microsoft.com/sharepoint/v3"/>
-    <ds:schemaRef ds:uri="http://www.w3.org/XML/1998/namespace"/>
-  </ds:schemaRefs>
-</ds:datastoreItem>
-</file>
-
-<file path=customXml/itemProps4.xml><?xml version="1.0" encoding="utf-8"?>
-<ds:datastoreItem xmlns:ds="http://schemas.openxmlformats.org/officeDocument/2006/customXml" ds:itemID="{15CF3461-70D1-4B54-AFAB-DAFDA0A238CD}">
-  <ds:schemaRefs/>
-</ds:datastoreItem>
-</file>
-
-<file path=customXml/itemProps5.xml><?xml version="1.0" encoding="utf-8"?>
-<ds:datastoreItem xmlns:ds="http://schemas.openxmlformats.org/officeDocument/2006/customXml" ds:itemID="{85D77EE6-52B7-48BE-9EDB-748F1EBB53DE}">
-  <ds:schemaRefs/>
-</ds:datastoreItem>
-</file>
-
-<file path=customXml/itemProps6.xml><?xml version="1.0" encoding="utf-8"?>
-<ds:datastoreItem xmlns:ds="http://schemas.openxmlformats.org/officeDocument/2006/customXml" ds:itemID="{1581BFFB-B4CE-47A8-BE77-DC1339B1E5A7}">
-  <ds:schemaRefs/>
-</ds:datastoreItem>
-</file>
-
-<file path=customXml/itemProps7.xml><?xml version="1.0" encoding="utf-8"?>
-<ds:datastoreItem xmlns:ds="http://schemas.openxmlformats.org/officeDocument/2006/customXml" ds:itemID="{D9FE249F-833E-4CF0-BECB-552D01D7DC9E}">
-  <ds:schemaRefs/>
-</ds:datastoreItem>
-</file>
-
-<file path=customXml/itemProps8.xml><?xml version="1.0" encoding="utf-8"?>
+<file path=customXml/itemProps9.xml><?xml version="1.0" encoding="utf-8"?>
 <ds:datastoreItem xmlns:ds="http://schemas.openxmlformats.org/officeDocument/2006/customXml" ds:itemID="{D8097D0C-BE3E-4AEC-9593-65CFCCB19297}">
   <ds:schemaRefs/>
 </ds:datastoreItem>
-</file>
-
-<file path=customXml/itemProps9.xml><?xml version="1.0" encoding="utf-8"?>
-<ds:datastoreItem xmlns:ds="http://schemas.openxmlformats.org/officeDocument/2006/customXml" ds:itemID="{C770A9D8-EB8A-4EA7-9CCD-8AD3EAF96C52}">
-  <ds:schemaRefs>
-    <ds:schemaRef ds:uri="http://schemas.microsoft.com/sharepoint/v3/contenttype/forms"/>
-  </ds:schemaRefs>
-</ds:datastoreItem>
 </file>
</xml_diff>